<commit_message>
GL NN Loan Default Prediction Presentation - Post normalization analysis.
</commit_message>
<xml_diff>
--- a/Neural Networks - Loan Default/Loan Default Prediction Presentation - Business Interpretation - John Buczkowski.pptx
+++ b/Neural Networks - Loan Default/Loan Default Prediction Presentation - Business Interpretation - John Buczkowski.pptx
@@ -7,7 +7,7 @@
     <p:sldMasterId id="2147483680" r:id="rId3"/>
   </p:sldMasterIdLst>
   <p:notesMasterIdLst>
-    <p:notesMasterId r:id="rId51"/>
+    <p:notesMasterId r:id="rId53"/>
   </p:notesMasterIdLst>
   <p:sldIdLst>
     <p:sldId id="256" r:id="rId4"/>
@@ -41,51 +41,53 @@
     <p:sldId id="310" r:id="rId32"/>
     <p:sldId id="312" r:id="rId33"/>
     <p:sldId id="313" r:id="rId34"/>
-    <p:sldId id="311" r:id="rId35"/>
-    <p:sldId id="263" r:id="rId36"/>
-    <p:sldId id="264" r:id="rId37"/>
-    <p:sldId id="265" r:id="rId38"/>
-    <p:sldId id="266" r:id="rId39"/>
-    <p:sldId id="267" r:id="rId40"/>
-    <p:sldId id="268" r:id="rId41"/>
-    <p:sldId id="269" r:id="rId42"/>
-    <p:sldId id="270" r:id="rId43"/>
-    <p:sldId id="271" r:id="rId44"/>
-    <p:sldId id="272" r:id="rId45"/>
-    <p:sldId id="273" r:id="rId46"/>
-    <p:sldId id="274" r:id="rId47"/>
-    <p:sldId id="275" r:id="rId48"/>
-    <p:sldId id="276" r:id="rId49"/>
-    <p:sldId id="277" r:id="rId50"/>
+    <p:sldId id="314" r:id="rId35"/>
+    <p:sldId id="315" r:id="rId36"/>
+    <p:sldId id="311" r:id="rId37"/>
+    <p:sldId id="263" r:id="rId38"/>
+    <p:sldId id="264" r:id="rId39"/>
+    <p:sldId id="265" r:id="rId40"/>
+    <p:sldId id="266" r:id="rId41"/>
+    <p:sldId id="267" r:id="rId42"/>
+    <p:sldId id="268" r:id="rId43"/>
+    <p:sldId id="269" r:id="rId44"/>
+    <p:sldId id="270" r:id="rId45"/>
+    <p:sldId id="271" r:id="rId46"/>
+    <p:sldId id="272" r:id="rId47"/>
+    <p:sldId id="273" r:id="rId48"/>
+    <p:sldId id="274" r:id="rId49"/>
+    <p:sldId id="275" r:id="rId50"/>
+    <p:sldId id="276" r:id="rId51"/>
+    <p:sldId id="277" r:id="rId52"/>
   </p:sldIdLst>
   <p:sldSz cx="9144000" cy="5143500" type="screen16x9"/>
   <p:notesSz cx="6858000" cy="9144000"/>
   <p:embeddedFontLst>
     <p:embeddedFont>
       <p:font typeface="Century Gothic" panose="020B0502020202020204" pitchFamily="34" charset="0"/>
-      <p:regular r:id="rId52"/>
-      <p:bold r:id="rId53"/>
-      <p:italic r:id="rId54"/>
-      <p:boldItalic r:id="rId55"/>
+      <p:regular r:id="rId54"/>
+      <p:bold r:id="rId55"/>
+      <p:italic r:id="rId56"/>
+      <p:boldItalic r:id="rId57"/>
     </p:embeddedFont>
     <p:embeddedFont>
       <p:font typeface="Nunito" pitchFamily="2" charset="0"/>
-      <p:regular r:id="rId56"/>
-      <p:bold r:id="rId57"/>
-      <p:italic r:id="rId58"/>
-      <p:boldItalic r:id="rId59"/>
+      <p:regular r:id="rId58"/>
+      <p:bold r:id="rId59"/>
+      <p:italic r:id="rId60"/>
+      <p:boldItalic r:id="rId61"/>
     </p:embeddedFont>
     <p:embeddedFont>
       <p:font typeface="Nunito ExtraBold" pitchFamily="2" charset="0"/>
-      <p:bold r:id="rId60"/>
-      <p:boldItalic r:id="rId61"/>
+      <p:bold r:id="rId62"/>
+      <p:boldItalic r:id="rId63"/>
     </p:embeddedFont>
     <p:embeddedFont>
       <p:font typeface="Nunito SemiBold" pitchFamily="2" charset="0"/>
-      <p:regular r:id="rId62"/>
-      <p:bold r:id="rId63"/>
-      <p:italic r:id="rId64"/>
-      <p:boldItalic r:id="rId65"/>
+      <p:regular r:id="rId64"/>
+      <p:bold r:id="rId65"/>
+      <p:italic r:id="rId66"/>
+      <p:boldItalic r:id="rId67"/>
     </p:embeddedFont>
   </p:embeddedFontLst>
   <p:defaultTextStyle>
@@ -3922,6 +3924,418 @@
         <p:cNvPr id="1" name="Shape 184">
           <a:extLst>
             <a:ext uri="{FF2B5EF4-FFF2-40B4-BE49-F238E27FC236}">
+              <a16:creationId xmlns:a16="http://schemas.microsoft.com/office/drawing/2014/main" id="{D9019F31-3A3F-CA5A-97DC-FE5C299A2DC9}"/>
+            </a:ext>
+          </a:extLst>
+        </p:cNvPr>
+        <p:cNvGrpSpPr/>
+        <p:nvPr/>
+      </p:nvGrpSpPr>
+      <p:grpSpPr>
+        <a:xfrm>
+          <a:off x="0" y="0"/>
+          <a:ext cx="0" cy="0"/>
+          <a:chOff x="0" y="0"/>
+          <a:chExt cx="0" cy="0"/>
+        </a:xfrm>
+      </p:grpSpPr>
+      <p:sp>
+        <p:nvSpPr>
+          <p:cNvPr id="185" name="Google Shape;185;p7:notes">
+            <a:extLst>
+              <a:ext uri="{FF2B5EF4-FFF2-40B4-BE49-F238E27FC236}">
+                <a16:creationId xmlns:a16="http://schemas.microsoft.com/office/drawing/2014/main" id="{24918353-388F-15E2-76A4-88013BB3F223}"/>
+              </a:ext>
+            </a:extLst>
+          </p:cNvPr>
+          <p:cNvSpPr>
+            <a:spLocks noGrp="1" noRot="1" noChangeAspect="1"/>
+          </p:cNvSpPr>
+          <p:nvPr>
+            <p:ph type="sldImg" idx="2"/>
+          </p:nvPr>
+        </p:nvSpPr>
+        <p:spPr>
+          <a:xfrm>
+            <a:off x="381000" y="685800"/>
+            <a:ext cx="6096000" cy="3429000"/>
+          </a:xfrm>
+          <a:custGeom>
+            <a:avLst/>
+            <a:gdLst/>
+            <a:ahLst/>
+            <a:cxnLst/>
+            <a:rect l="l" t="t" r="r" b="b"/>
+            <a:pathLst>
+              <a:path w="120000" h="120000" extrusionOk="0">
+                <a:moveTo>
+                  <a:pt x="0" y="0"/>
+                </a:moveTo>
+                <a:lnTo>
+                  <a:pt x="120000" y="0"/>
+                </a:lnTo>
+                <a:lnTo>
+                  <a:pt x="120000" y="120000"/>
+                </a:lnTo>
+                <a:lnTo>
+                  <a:pt x="0" y="120000"/>
+                </a:lnTo>
+                <a:close/>
+              </a:path>
+            </a:pathLst>
+          </a:custGeom>
+          <a:noFill/>
+          <a:ln w="9525" cap="flat" cmpd="sng">
+            <a:solidFill>
+              <a:srgbClr val="000000"/>
+            </a:solidFill>
+            <a:prstDash val="solid"/>
+            <a:round/>
+            <a:headEnd type="none" w="sm" len="sm"/>
+            <a:tailEnd type="none" w="sm" len="sm"/>
+          </a:ln>
+        </p:spPr>
+      </p:sp>
+      <p:sp>
+        <p:nvSpPr>
+          <p:cNvPr id="186" name="Google Shape;186;p7:notes">
+            <a:extLst>
+              <a:ext uri="{FF2B5EF4-FFF2-40B4-BE49-F238E27FC236}">
+                <a16:creationId xmlns:a16="http://schemas.microsoft.com/office/drawing/2014/main" id="{F62EDEA7-58BF-B85B-140D-53998B425F49}"/>
+              </a:ext>
+            </a:extLst>
+          </p:cNvPr>
+          <p:cNvSpPr txBox="1">
+            <a:spLocks noGrp="1"/>
+          </p:cNvSpPr>
+          <p:nvPr>
+            <p:ph type="body" idx="1"/>
+          </p:nvPr>
+        </p:nvSpPr>
+        <p:spPr>
+          <a:xfrm>
+            <a:off x="685800" y="4343400"/>
+            <a:ext cx="5486400" cy="4114800"/>
+          </a:xfrm>
+          <a:prstGeom prst="rect">
+            <a:avLst/>
+          </a:prstGeom>
+          <a:noFill/>
+          <a:ln>
+            <a:noFill/>
+          </a:ln>
+        </p:spPr>
+        <p:txBody>
+          <a:bodyPr spcFirstLastPara="1" wrap="square" lIns="91425" tIns="91425" rIns="91425" bIns="91425" anchor="t" anchorCtr="0">
+            <a:noAutofit/>
+          </a:bodyPr>
+          <a:lstStyle/>
+          <a:p>
+            <a:pPr marL="0" lvl="0" indent="0" algn="l" rtl="0">
+              <a:lnSpc>
+                <a:spcPct val="100000"/>
+              </a:lnSpc>
+              <a:spcBef>
+                <a:spcPts val="0"/>
+              </a:spcBef>
+              <a:spcAft>
+                <a:spcPts val="0"/>
+              </a:spcAft>
+              <a:buSzPts val="1100"/>
+              <a:buNone/>
+            </a:pPr>
+            <a:endParaRPr/>
+          </a:p>
+        </p:txBody>
+      </p:sp>
+    </p:spTree>
+    <p:extLst>
+      <p:ext uri="{BB962C8B-B14F-4D97-AF65-F5344CB8AC3E}">
+        <p14:creationId xmlns:p14="http://schemas.microsoft.com/office/powerpoint/2010/main" val="11575017"/>
+      </p:ext>
+    </p:extLst>
+  </p:cSld>
+  <p:clrMapOvr>
+    <a:masterClrMapping/>
+  </p:clrMapOvr>
+</p:notes>
+</file>
+
+<file path=ppt/notesSlides/notesSlide3.xml><?xml version="1.0" encoding="utf-8"?>
+<p:notes xmlns:a="http://schemas.openxmlformats.org/drawingml/2006/main" xmlns:r="http://schemas.openxmlformats.org/officeDocument/2006/relationships" xmlns:p="http://schemas.openxmlformats.org/presentationml/2006/main" showMasterSp="0" showMasterPhAnim="0">
+  <p:cSld>
+    <p:spTree>
+      <p:nvGrpSpPr>
+        <p:cNvPr id="1" name="Shape 160"/>
+        <p:cNvGrpSpPr/>
+        <p:nvPr/>
+      </p:nvGrpSpPr>
+      <p:grpSpPr>
+        <a:xfrm>
+          <a:off x="0" y="0"/>
+          <a:ext cx="0" cy="0"/>
+          <a:chOff x="0" y="0"/>
+          <a:chExt cx="0" cy="0"/>
+        </a:xfrm>
+      </p:grpSpPr>
+      <p:sp>
+        <p:nvSpPr>
+          <p:cNvPr id="161" name="Google Shape;161;p3:notes"/>
+          <p:cNvSpPr>
+            <a:spLocks noGrp="1" noRot="1" noChangeAspect="1"/>
+          </p:cNvSpPr>
+          <p:nvPr>
+            <p:ph type="sldImg" idx="2"/>
+          </p:nvPr>
+        </p:nvSpPr>
+        <p:spPr>
+          <a:xfrm>
+            <a:off x="381000" y="685800"/>
+            <a:ext cx="6096000" cy="3429000"/>
+          </a:xfrm>
+          <a:custGeom>
+            <a:avLst/>
+            <a:gdLst/>
+            <a:ahLst/>
+            <a:cxnLst/>
+            <a:rect l="l" t="t" r="r" b="b"/>
+            <a:pathLst>
+              <a:path w="120000" h="120000" extrusionOk="0">
+                <a:moveTo>
+                  <a:pt x="0" y="0"/>
+                </a:moveTo>
+                <a:lnTo>
+                  <a:pt x="120000" y="0"/>
+                </a:lnTo>
+                <a:lnTo>
+                  <a:pt x="120000" y="120000"/>
+                </a:lnTo>
+                <a:lnTo>
+                  <a:pt x="0" y="120000"/>
+                </a:lnTo>
+                <a:close/>
+              </a:path>
+            </a:pathLst>
+          </a:custGeom>
+          <a:noFill/>
+          <a:ln w="9525" cap="flat" cmpd="sng">
+            <a:solidFill>
+              <a:srgbClr val="000000"/>
+            </a:solidFill>
+            <a:prstDash val="solid"/>
+            <a:round/>
+            <a:headEnd type="none" w="sm" len="sm"/>
+            <a:tailEnd type="none" w="sm" len="sm"/>
+          </a:ln>
+        </p:spPr>
+      </p:sp>
+      <p:sp>
+        <p:nvSpPr>
+          <p:cNvPr id="162" name="Google Shape;162;p3:notes"/>
+          <p:cNvSpPr txBox="1">
+            <a:spLocks noGrp="1"/>
+          </p:cNvSpPr>
+          <p:nvPr>
+            <p:ph type="body" idx="1"/>
+          </p:nvPr>
+        </p:nvSpPr>
+        <p:spPr>
+          <a:xfrm>
+            <a:off x="685800" y="4343400"/>
+            <a:ext cx="5486400" cy="4114800"/>
+          </a:xfrm>
+          <a:prstGeom prst="rect">
+            <a:avLst/>
+          </a:prstGeom>
+          <a:noFill/>
+          <a:ln>
+            <a:noFill/>
+          </a:ln>
+        </p:spPr>
+        <p:txBody>
+          <a:bodyPr spcFirstLastPara="1" wrap="square" lIns="91425" tIns="91425" rIns="91425" bIns="91425" anchor="t" anchorCtr="0">
+            <a:noAutofit/>
+          </a:bodyPr>
+          <a:lstStyle/>
+          <a:p>
+            <a:pPr marL="0" lvl="0" indent="0" algn="l" rtl="0">
+              <a:lnSpc>
+                <a:spcPct val="100000"/>
+              </a:lnSpc>
+              <a:spcBef>
+                <a:spcPts val="0"/>
+              </a:spcBef>
+              <a:spcAft>
+                <a:spcPts val="0"/>
+              </a:spcAft>
+              <a:buSzPts val="1100"/>
+              <a:buNone/>
+            </a:pPr>
+            <a:endParaRPr/>
+          </a:p>
+        </p:txBody>
+      </p:sp>
+    </p:spTree>
+  </p:cSld>
+  <p:clrMapOvr>
+    <a:masterClrMapping/>
+  </p:clrMapOvr>
+</p:notes>
+</file>
+
+<file path=ppt/notesSlides/notesSlide30.xml><?xml version="1.0" encoding="utf-8"?>
+<p:notes xmlns:a="http://schemas.openxmlformats.org/drawingml/2006/main" xmlns:r="http://schemas.openxmlformats.org/officeDocument/2006/relationships" xmlns:p="http://schemas.openxmlformats.org/presentationml/2006/main" showMasterSp="0" showMasterPhAnim="0">
+  <p:cSld>
+    <p:spTree>
+      <p:nvGrpSpPr>
+        <p:cNvPr id="1" name="Shape 184">
+          <a:extLst>
+            <a:ext uri="{FF2B5EF4-FFF2-40B4-BE49-F238E27FC236}">
+              <a16:creationId xmlns:a16="http://schemas.microsoft.com/office/drawing/2014/main" id="{BAB4762A-8ACD-10AA-0119-01EDA279E7E0}"/>
+            </a:ext>
+          </a:extLst>
+        </p:cNvPr>
+        <p:cNvGrpSpPr/>
+        <p:nvPr/>
+      </p:nvGrpSpPr>
+      <p:grpSpPr>
+        <a:xfrm>
+          <a:off x="0" y="0"/>
+          <a:ext cx="0" cy="0"/>
+          <a:chOff x="0" y="0"/>
+          <a:chExt cx="0" cy="0"/>
+        </a:xfrm>
+      </p:grpSpPr>
+      <p:sp>
+        <p:nvSpPr>
+          <p:cNvPr id="185" name="Google Shape;185;p7:notes">
+            <a:extLst>
+              <a:ext uri="{FF2B5EF4-FFF2-40B4-BE49-F238E27FC236}">
+                <a16:creationId xmlns:a16="http://schemas.microsoft.com/office/drawing/2014/main" id="{2B616732-9D22-BC13-BEC1-5C441760C0B7}"/>
+              </a:ext>
+            </a:extLst>
+          </p:cNvPr>
+          <p:cNvSpPr>
+            <a:spLocks noGrp="1" noRot="1" noChangeAspect="1"/>
+          </p:cNvSpPr>
+          <p:nvPr>
+            <p:ph type="sldImg" idx="2"/>
+          </p:nvPr>
+        </p:nvSpPr>
+        <p:spPr>
+          <a:xfrm>
+            <a:off x="381000" y="685800"/>
+            <a:ext cx="6096000" cy="3429000"/>
+          </a:xfrm>
+          <a:custGeom>
+            <a:avLst/>
+            <a:gdLst/>
+            <a:ahLst/>
+            <a:cxnLst/>
+            <a:rect l="l" t="t" r="r" b="b"/>
+            <a:pathLst>
+              <a:path w="120000" h="120000" extrusionOk="0">
+                <a:moveTo>
+                  <a:pt x="0" y="0"/>
+                </a:moveTo>
+                <a:lnTo>
+                  <a:pt x="120000" y="0"/>
+                </a:lnTo>
+                <a:lnTo>
+                  <a:pt x="120000" y="120000"/>
+                </a:lnTo>
+                <a:lnTo>
+                  <a:pt x="0" y="120000"/>
+                </a:lnTo>
+                <a:close/>
+              </a:path>
+            </a:pathLst>
+          </a:custGeom>
+          <a:noFill/>
+          <a:ln w="9525" cap="flat" cmpd="sng">
+            <a:solidFill>
+              <a:srgbClr val="000000"/>
+            </a:solidFill>
+            <a:prstDash val="solid"/>
+            <a:round/>
+            <a:headEnd type="none" w="sm" len="sm"/>
+            <a:tailEnd type="none" w="sm" len="sm"/>
+          </a:ln>
+        </p:spPr>
+      </p:sp>
+      <p:sp>
+        <p:nvSpPr>
+          <p:cNvPr id="186" name="Google Shape;186;p7:notes">
+            <a:extLst>
+              <a:ext uri="{FF2B5EF4-FFF2-40B4-BE49-F238E27FC236}">
+                <a16:creationId xmlns:a16="http://schemas.microsoft.com/office/drawing/2014/main" id="{C6486467-9044-DCAA-2E63-2093ADF3C32B}"/>
+              </a:ext>
+            </a:extLst>
+          </p:cNvPr>
+          <p:cNvSpPr txBox="1">
+            <a:spLocks noGrp="1"/>
+          </p:cNvSpPr>
+          <p:nvPr>
+            <p:ph type="body" idx="1"/>
+          </p:nvPr>
+        </p:nvSpPr>
+        <p:spPr>
+          <a:xfrm>
+            <a:off x="685800" y="4343400"/>
+            <a:ext cx="5486400" cy="4114800"/>
+          </a:xfrm>
+          <a:prstGeom prst="rect">
+            <a:avLst/>
+          </a:prstGeom>
+          <a:noFill/>
+          <a:ln>
+            <a:noFill/>
+          </a:ln>
+        </p:spPr>
+        <p:txBody>
+          <a:bodyPr spcFirstLastPara="1" wrap="square" lIns="91425" tIns="91425" rIns="91425" bIns="91425" anchor="t" anchorCtr="0">
+            <a:noAutofit/>
+          </a:bodyPr>
+          <a:lstStyle/>
+          <a:p>
+            <a:pPr marL="0" lvl="0" indent="0" algn="l" rtl="0">
+              <a:lnSpc>
+                <a:spcPct val="100000"/>
+              </a:lnSpc>
+              <a:spcBef>
+                <a:spcPts val="0"/>
+              </a:spcBef>
+              <a:spcAft>
+                <a:spcPts val="0"/>
+              </a:spcAft>
+              <a:buSzPts val="1100"/>
+              <a:buNone/>
+            </a:pPr>
+            <a:endParaRPr/>
+          </a:p>
+        </p:txBody>
+      </p:sp>
+    </p:spTree>
+    <p:extLst>
+      <p:ext uri="{BB962C8B-B14F-4D97-AF65-F5344CB8AC3E}">
+        <p14:creationId xmlns:p14="http://schemas.microsoft.com/office/powerpoint/2010/main" val="2505064110"/>
+      </p:ext>
+    </p:extLst>
+  </p:cSld>
+  <p:clrMapOvr>
+    <a:masterClrMapping/>
+  </p:clrMapOvr>
+</p:notes>
+</file>
+
+<file path=ppt/notesSlides/notesSlide31.xml><?xml version="1.0" encoding="utf-8"?>
+<p:notes xmlns:a="http://schemas.openxmlformats.org/drawingml/2006/main" xmlns:r="http://schemas.openxmlformats.org/officeDocument/2006/relationships" xmlns:p="http://schemas.openxmlformats.org/presentationml/2006/main" showMasterSp="0" showMasterPhAnim="0">
+  <p:cSld>
+    <p:spTree>
+      <p:nvGrpSpPr>
+        <p:cNvPr id="1" name="Shape 184">
+          <a:extLst>
+            <a:ext uri="{FF2B5EF4-FFF2-40B4-BE49-F238E27FC236}">
               <a16:creationId xmlns:a16="http://schemas.microsoft.com/office/drawing/2014/main" id="{70A94EF6-68E0-296F-6302-68C505BA4333}"/>
             </a:ext>
           </a:extLst>
@@ -4059,129 +4473,7 @@
 </p:notes>
 </file>
 
-<file path=ppt/notesSlides/notesSlide3.xml><?xml version="1.0" encoding="utf-8"?>
-<p:notes xmlns:a="http://schemas.openxmlformats.org/drawingml/2006/main" xmlns:r="http://schemas.openxmlformats.org/officeDocument/2006/relationships" xmlns:p="http://schemas.openxmlformats.org/presentationml/2006/main" showMasterSp="0" showMasterPhAnim="0">
-  <p:cSld>
-    <p:spTree>
-      <p:nvGrpSpPr>
-        <p:cNvPr id="1" name="Shape 160"/>
-        <p:cNvGrpSpPr/>
-        <p:nvPr/>
-      </p:nvGrpSpPr>
-      <p:grpSpPr>
-        <a:xfrm>
-          <a:off x="0" y="0"/>
-          <a:ext cx="0" cy="0"/>
-          <a:chOff x="0" y="0"/>
-          <a:chExt cx="0" cy="0"/>
-        </a:xfrm>
-      </p:grpSpPr>
-      <p:sp>
-        <p:nvSpPr>
-          <p:cNvPr id="161" name="Google Shape;161;p3:notes"/>
-          <p:cNvSpPr>
-            <a:spLocks noGrp="1" noRot="1" noChangeAspect="1"/>
-          </p:cNvSpPr>
-          <p:nvPr>
-            <p:ph type="sldImg" idx="2"/>
-          </p:nvPr>
-        </p:nvSpPr>
-        <p:spPr>
-          <a:xfrm>
-            <a:off x="381000" y="685800"/>
-            <a:ext cx="6096000" cy="3429000"/>
-          </a:xfrm>
-          <a:custGeom>
-            <a:avLst/>
-            <a:gdLst/>
-            <a:ahLst/>
-            <a:cxnLst/>
-            <a:rect l="l" t="t" r="r" b="b"/>
-            <a:pathLst>
-              <a:path w="120000" h="120000" extrusionOk="0">
-                <a:moveTo>
-                  <a:pt x="0" y="0"/>
-                </a:moveTo>
-                <a:lnTo>
-                  <a:pt x="120000" y="0"/>
-                </a:lnTo>
-                <a:lnTo>
-                  <a:pt x="120000" y="120000"/>
-                </a:lnTo>
-                <a:lnTo>
-                  <a:pt x="0" y="120000"/>
-                </a:lnTo>
-                <a:close/>
-              </a:path>
-            </a:pathLst>
-          </a:custGeom>
-          <a:noFill/>
-          <a:ln w="9525" cap="flat" cmpd="sng">
-            <a:solidFill>
-              <a:srgbClr val="000000"/>
-            </a:solidFill>
-            <a:prstDash val="solid"/>
-            <a:round/>
-            <a:headEnd type="none" w="sm" len="sm"/>
-            <a:tailEnd type="none" w="sm" len="sm"/>
-          </a:ln>
-        </p:spPr>
-      </p:sp>
-      <p:sp>
-        <p:nvSpPr>
-          <p:cNvPr id="162" name="Google Shape;162;p3:notes"/>
-          <p:cNvSpPr txBox="1">
-            <a:spLocks noGrp="1"/>
-          </p:cNvSpPr>
-          <p:nvPr>
-            <p:ph type="body" idx="1"/>
-          </p:nvPr>
-        </p:nvSpPr>
-        <p:spPr>
-          <a:xfrm>
-            <a:off x="685800" y="4343400"/>
-            <a:ext cx="5486400" cy="4114800"/>
-          </a:xfrm>
-          <a:prstGeom prst="rect">
-            <a:avLst/>
-          </a:prstGeom>
-          <a:noFill/>
-          <a:ln>
-            <a:noFill/>
-          </a:ln>
-        </p:spPr>
-        <p:txBody>
-          <a:bodyPr spcFirstLastPara="1" wrap="square" lIns="91425" tIns="91425" rIns="91425" bIns="91425" anchor="t" anchorCtr="0">
-            <a:noAutofit/>
-          </a:bodyPr>
-          <a:lstStyle/>
-          <a:p>
-            <a:pPr marL="0" lvl="0" indent="0" algn="l" rtl="0">
-              <a:lnSpc>
-                <a:spcPct val="100000"/>
-              </a:lnSpc>
-              <a:spcBef>
-                <a:spcPts val="0"/>
-              </a:spcBef>
-              <a:spcAft>
-                <a:spcPts val="0"/>
-              </a:spcAft>
-              <a:buSzPts val="1100"/>
-              <a:buNone/>
-            </a:pPr>
-            <a:endParaRPr/>
-          </a:p>
-        </p:txBody>
-      </p:sp>
-    </p:spTree>
-  </p:cSld>
-  <p:clrMapOvr>
-    <a:masterClrMapping/>
-  </p:clrMapOvr>
-</p:notes>
-</file>
-
-<file path=ppt/notesSlides/notesSlide30.xml><?xml version="1.0" encoding="utf-8"?>
+<file path=ppt/notesSlides/notesSlide32.xml><?xml version="1.0" encoding="utf-8"?>
 <p:notes xmlns:a="http://schemas.openxmlformats.org/drawingml/2006/main" xmlns:r="http://schemas.openxmlformats.org/officeDocument/2006/relationships" xmlns:p="http://schemas.openxmlformats.org/presentationml/2006/main" showMasterSp="0" showMasterPhAnim="0">
   <p:cSld>
     <p:spTree>
@@ -4303,7 +4595,7 @@
 </p:notes>
 </file>
 
-<file path=ppt/notesSlides/notesSlide31.xml><?xml version="1.0" encoding="utf-8"?>
+<file path=ppt/notesSlides/notesSlide33.xml><?xml version="1.0" encoding="utf-8"?>
 <p:notes xmlns:a="http://schemas.openxmlformats.org/drawingml/2006/main" xmlns:r="http://schemas.openxmlformats.org/officeDocument/2006/relationships" xmlns:p="http://schemas.openxmlformats.org/presentationml/2006/main" showMasterSp="0" showMasterPhAnim="0">
   <p:cSld>
     <p:spTree>
@@ -4407,7 +4699,7 @@
 </p:notes>
 </file>
 
-<file path=ppt/notesSlides/notesSlide32.xml><?xml version="1.0" encoding="utf-8"?>
+<file path=ppt/notesSlides/notesSlide34.xml><?xml version="1.0" encoding="utf-8"?>
 <p:notes xmlns:a="http://schemas.openxmlformats.org/drawingml/2006/main" xmlns:r="http://schemas.openxmlformats.org/officeDocument/2006/relationships" xmlns:p="http://schemas.openxmlformats.org/presentationml/2006/main" showMasterSp="0" showMasterPhAnim="0">
   <p:cSld>
     <p:spTree>
@@ -4511,7 +4803,7 @@
 </p:notes>
 </file>
 
-<file path=ppt/notesSlides/notesSlide33.xml><?xml version="1.0" encoding="utf-8"?>
+<file path=ppt/notesSlides/notesSlide35.xml><?xml version="1.0" encoding="utf-8"?>
 <p:notes xmlns:a="http://schemas.openxmlformats.org/drawingml/2006/main" xmlns:r="http://schemas.openxmlformats.org/officeDocument/2006/relationships" xmlns:p="http://schemas.openxmlformats.org/presentationml/2006/main" showMasterSp="0" showMasterPhAnim="0">
   <p:cSld>
     <p:spTree>
@@ -4633,7 +4925,7 @@
 </p:notes>
 </file>
 
-<file path=ppt/notesSlides/notesSlide34.xml><?xml version="1.0" encoding="utf-8"?>
+<file path=ppt/notesSlides/notesSlide36.xml><?xml version="1.0" encoding="utf-8"?>
 <p:notes xmlns:a="http://schemas.openxmlformats.org/drawingml/2006/main" xmlns:r="http://schemas.openxmlformats.org/officeDocument/2006/relationships" xmlns:p="http://schemas.openxmlformats.org/presentationml/2006/main" showMasterSp="0" showMasterPhAnim="0">
   <p:cSld>
     <p:spTree>
@@ -4737,7 +5029,7 @@
 </p:notes>
 </file>
 
-<file path=ppt/notesSlides/notesSlide35.xml><?xml version="1.0" encoding="utf-8"?>
+<file path=ppt/notesSlides/notesSlide37.xml><?xml version="1.0" encoding="utf-8"?>
 <p:notes xmlns:a="http://schemas.openxmlformats.org/drawingml/2006/main" xmlns:r="http://schemas.openxmlformats.org/officeDocument/2006/relationships" xmlns:p="http://schemas.openxmlformats.org/presentationml/2006/main" showMasterSp="0" showMasterPhAnim="0">
   <p:cSld>
     <p:spTree>
@@ -4841,7 +5133,7 @@
 </p:notes>
 </file>
 
-<file path=ppt/notesSlides/notesSlide36.xml><?xml version="1.0" encoding="utf-8"?>
+<file path=ppt/notesSlides/notesSlide38.xml><?xml version="1.0" encoding="utf-8"?>
 <p:notes xmlns:a="http://schemas.openxmlformats.org/drawingml/2006/main" xmlns:r="http://schemas.openxmlformats.org/officeDocument/2006/relationships" xmlns:p="http://schemas.openxmlformats.org/presentationml/2006/main" showMasterSp="0" showMasterPhAnim="0">
   <p:cSld>
     <p:spTree>
@@ -4945,7 +5237,7 @@
 </p:notes>
 </file>
 
-<file path=ppt/notesSlides/notesSlide37.xml><?xml version="1.0" encoding="utf-8"?>
+<file path=ppt/notesSlides/notesSlide39.xml><?xml version="1.0" encoding="utf-8"?>
 <p:notes xmlns:a="http://schemas.openxmlformats.org/drawingml/2006/main" xmlns:r="http://schemas.openxmlformats.org/officeDocument/2006/relationships" xmlns:p="http://schemas.openxmlformats.org/presentationml/2006/main" showMasterSp="0" showMasterPhAnim="0">
   <p:cSld>
     <p:spTree>
@@ -5016,250 +5308,6 @@
       <p:sp>
         <p:nvSpPr>
           <p:cNvPr id="230" name="Google Shape;230;p19:notes"/>
-          <p:cNvSpPr txBox="1">
-            <a:spLocks noGrp="1"/>
-          </p:cNvSpPr>
-          <p:nvPr>
-            <p:ph type="body" idx="1"/>
-          </p:nvPr>
-        </p:nvSpPr>
-        <p:spPr>
-          <a:xfrm>
-            <a:off x="685800" y="4343400"/>
-            <a:ext cx="5486400" cy="4114800"/>
-          </a:xfrm>
-          <a:prstGeom prst="rect">
-            <a:avLst/>
-          </a:prstGeom>
-          <a:noFill/>
-          <a:ln>
-            <a:noFill/>
-          </a:ln>
-        </p:spPr>
-        <p:txBody>
-          <a:bodyPr spcFirstLastPara="1" wrap="square" lIns="91425" tIns="91425" rIns="91425" bIns="91425" anchor="t" anchorCtr="0">
-            <a:noAutofit/>
-          </a:bodyPr>
-          <a:lstStyle/>
-          <a:p>
-            <a:pPr marL="0" lvl="0" indent="0" algn="l" rtl="0">
-              <a:lnSpc>
-                <a:spcPct val="100000"/>
-              </a:lnSpc>
-              <a:spcBef>
-                <a:spcPts val="0"/>
-              </a:spcBef>
-              <a:spcAft>
-                <a:spcPts val="0"/>
-              </a:spcAft>
-              <a:buSzPts val="1100"/>
-              <a:buNone/>
-            </a:pPr>
-            <a:endParaRPr/>
-          </a:p>
-        </p:txBody>
-      </p:sp>
-    </p:spTree>
-  </p:cSld>
-  <p:clrMapOvr>
-    <a:masterClrMapping/>
-  </p:clrMapOvr>
-</p:notes>
-</file>
-
-<file path=ppt/notesSlides/notesSlide38.xml><?xml version="1.0" encoding="utf-8"?>
-<p:notes xmlns:a="http://schemas.openxmlformats.org/drawingml/2006/main" xmlns:r="http://schemas.openxmlformats.org/officeDocument/2006/relationships" xmlns:p="http://schemas.openxmlformats.org/presentationml/2006/main" showMasterSp="0" showMasterPhAnim="0">
-  <p:cSld>
-    <p:spTree>
-      <p:nvGrpSpPr>
-        <p:cNvPr id="1" name="Shape 235"/>
-        <p:cNvGrpSpPr/>
-        <p:nvPr/>
-      </p:nvGrpSpPr>
-      <p:grpSpPr>
-        <a:xfrm>
-          <a:off x="0" y="0"/>
-          <a:ext cx="0" cy="0"/>
-          <a:chOff x="0" y="0"/>
-          <a:chExt cx="0" cy="0"/>
-        </a:xfrm>
-      </p:grpSpPr>
-      <p:sp>
-        <p:nvSpPr>
-          <p:cNvPr id="236" name="Google Shape;236;p20:notes"/>
-          <p:cNvSpPr>
-            <a:spLocks noGrp="1" noRot="1" noChangeAspect="1"/>
-          </p:cNvSpPr>
-          <p:nvPr>
-            <p:ph type="sldImg" idx="2"/>
-          </p:nvPr>
-        </p:nvSpPr>
-        <p:spPr>
-          <a:xfrm>
-            <a:off x="381000" y="685800"/>
-            <a:ext cx="6096000" cy="3429000"/>
-          </a:xfrm>
-          <a:custGeom>
-            <a:avLst/>
-            <a:gdLst/>
-            <a:ahLst/>
-            <a:cxnLst/>
-            <a:rect l="l" t="t" r="r" b="b"/>
-            <a:pathLst>
-              <a:path w="120000" h="120000" extrusionOk="0">
-                <a:moveTo>
-                  <a:pt x="0" y="0"/>
-                </a:moveTo>
-                <a:lnTo>
-                  <a:pt x="120000" y="0"/>
-                </a:lnTo>
-                <a:lnTo>
-                  <a:pt x="120000" y="120000"/>
-                </a:lnTo>
-                <a:lnTo>
-                  <a:pt x="0" y="120000"/>
-                </a:lnTo>
-                <a:close/>
-              </a:path>
-            </a:pathLst>
-          </a:custGeom>
-          <a:noFill/>
-          <a:ln w="9525" cap="flat" cmpd="sng">
-            <a:solidFill>
-              <a:srgbClr val="000000"/>
-            </a:solidFill>
-            <a:prstDash val="solid"/>
-            <a:round/>
-            <a:headEnd type="none" w="sm" len="sm"/>
-            <a:tailEnd type="none" w="sm" len="sm"/>
-          </a:ln>
-        </p:spPr>
-      </p:sp>
-      <p:sp>
-        <p:nvSpPr>
-          <p:cNvPr id="237" name="Google Shape;237;p20:notes"/>
-          <p:cNvSpPr txBox="1">
-            <a:spLocks noGrp="1"/>
-          </p:cNvSpPr>
-          <p:nvPr>
-            <p:ph type="body" idx="1"/>
-          </p:nvPr>
-        </p:nvSpPr>
-        <p:spPr>
-          <a:xfrm>
-            <a:off x="685800" y="4343400"/>
-            <a:ext cx="5486400" cy="4114800"/>
-          </a:xfrm>
-          <a:prstGeom prst="rect">
-            <a:avLst/>
-          </a:prstGeom>
-          <a:noFill/>
-          <a:ln>
-            <a:noFill/>
-          </a:ln>
-        </p:spPr>
-        <p:txBody>
-          <a:bodyPr spcFirstLastPara="1" wrap="square" lIns="91425" tIns="91425" rIns="91425" bIns="91425" anchor="t" anchorCtr="0">
-            <a:noAutofit/>
-          </a:bodyPr>
-          <a:lstStyle/>
-          <a:p>
-            <a:pPr marL="0" lvl="0" indent="0" algn="l" rtl="0">
-              <a:lnSpc>
-                <a:spcPct val="100000"/>
-              </a:lnSpc>
-              <a:spcBef>
-                <a:spcPts val="0"/>
-              </a:spcBef>
-              <a:spcAft>
-                <a:spcPts val="0"/>
-              </a:spcAft>
-              <a:buSzPts val="1100"/>
-              <a:buNone/>
-            </a:pPr>
-            <a:endParaRPr/>
-          </a:p>
-        </p:txBody>
-      </p:sp>
-    </p:spTree>
-  </p:cSld>
-  <p:clrMapOvr>
-    <a:masterClrMapping/>
-  </p:clrMapOvr>
-</p:notes>
-</file>
-
-<file path=ppt/notesSlides/notesSlide39.xml><?xml version="1.0" encoding="utf-8"?>
-<p:notes xmlns:a="http://schemas.openxmlformats.org/drawingml/2006/main" xmlns:r="http://schemas.openxmlformats.org/officeDocument/2006/relationships" xmlns:p="http://schemas.openxmlformats.org/presentationml/2006/main" showMasterSp="0" showMasterPhAnim="0">
-  <p:cSld>
-    <p:spTree>
-      <p:nvGrpSpPr>
-        <p:cNvPr id="1" name="Shape 242"/>
-        <p:cNvGrpSpPr/>
-        <p:nvPr/>
-      </p:nvGrpSpPr>
-      <p:grpSpPr>
-        <a:xfrm>
-          <a:off x="0" y="0"/>
-          <a:ext cx="0" cy="0"/>
-          <a:chOff x="0" y="0"/>
-          <a:chExt cx="0" cy="0"/>
-        </a:xfrm>
-      </p:grpSpPr>
-      <p:sp>
-        <p:nvSpPr>
-          <p:cNvPr id="243" name="Google Shape;243;g385ad5efec9_0_2:notes"/>
-          <p:cNvSpPr>
-            <a:spLocks noGrp="1" noRot="1" noChangeAspect="1"/>
-          </p:cNvSpPr>
-          <p:nvPr>
-            <p:ph type="sldImg" idx="2"/>
-          </p:nvPr>
-        </p:nvSpPr>
-        <p:spPr>
-          <a:xfrm>
-            <a:off x="381000" y="685800"/>
-            <a:ext cx="6096000" cy="3429000"/>
-          </a:xfrm>
-          <a:custGeom>
-            <a:avLst/>
-            <a:gdLst/>
-            <a:ahLst/>
-            <a:cxnLst/>
-            <a:rect l="l" t="t" r="r" b="b"/>
-            <a:pathLst>
-              <a:path w="120000" h="120000" extrusionOk="0">
-                <a:moveTo>
-                  <a:pt x="0" y="0"/>
-                </a:moveTo>
-                <a:lnTo>
-                  <a:pt x="120000" y="0"/>
-                </a:lnTo>
-                <a:lnTo>
-                  <a:pt x="120000" y="120000"/>
-                </a:lnTo>
-                <a:lnTo>
-                  <a:pt x="0" y="120000"/>
-                </a:lnTo>
-                <a:close/>
-              </a:path>
-            </a:pathLst>
-          </a:custGeom>
-          <a:noFill/>
-          <a:ln w="9525" cap="flat" cmpd="sng">
-            <a:solidFill>
-              <a:srgbClr val="000000"/>
-            </a:solidFill>
-            <a:prstDash val="solid"/>
-            <a:round/>
-            <a:headEnd type="none" w="sm" len="sm"/>
-            <a:tailEnd type="none" w="sm" len="sm"/>
-          </a:ln>
-        </p:spPr>
-      </p:sp>
-      <p:sp>
-        <p:nvSpPr>
-          <p:cNvPr id="244" name="Google Shape;244;g385ad5efec9_0_2:notes"/>
           <p:cNvSpPr txBox="1">
             <a:spLocks noGrp="1"/>
           </p:cNvSpPr>
@@ -5438,6 +5486,250 @@
   <p:cSld>
     <p:spTree>
       <p:nvGrpSpPr>
+        <p:cNvPr id="1" name="Shape 235"/>
+        <p:cNvGrpSpPr/>
+        <p:nvPr/>
+      </p:nvGrpSpPr>
+      <p:grpSpPr>
+        <a:xfrm>
+          <a:off x="0" y="0"/>
+          <a:ext cx="0" cy="0"/>
+          <a:chOff x="0" y="0"/>
+          <a:chExt cx="0" cy="0"/>
+        </a:xfrm>
+      </p:grpSpPr>
+      <p:sp>
+        <p:nvSpPr>
+          <p:cNvPr id="236" name="Google Shape;236;p20:notes"/>
+          <p:cNvSpPr>
+            <a:spLocks noGrp="1" noRot="1" noChangeAspect="1"/>
+          </p:cNvSpPr>
+          <p:nvPr>
+            <p:ph type="sldImg" idx="2"/>
+          </p:nvPr>
+        </p:nvSpPr>
+        <p:spPr>
+          <a:xfrm>
+            <a:off x="381000" y="685800"/>
+            <a:ext cx="6096000" cy="3429000"/>
+          </a:xfrm>
+          <a:custGeom>
+            <a:avLst/>
+            <a:gdLst/>
+            <a:ahLst/>
+            <a:cxnLst/>
+            <a:rect l="l" t="t" r="r" b="b"/>
+            <a:pathLst>
+              <a:path w="120000" h="120000" extrusionOk="0">
+                <a:moveTo>
+                  <a:pt x="0" y="0"/>
+                </a:moveTo>
+                <a:lnTo>
+                  <a:pt x="120000" y="0"/>
+                </a:lnTo>
+                <a:lnTo>
+                  <a:pt x="120000" y="120000"/>
+                </a:lnTo>
+                <a:lnTo>
+                  <a:pt x="0" y="120000"/>
+                </a:lnTo>
+                <a:close/>
+              </a:path>
+            </a:pathLst>
+          </a:custGeom>
+          <a:noFill/>
+          <a:ln w="9525" cap="flat" cmpd="sng">
+            <a:solidFill>
+              <a:srgbClr val="000000"/>
+            </a:solidFill>
+            <a:prstDash val="solid"/>
+            <a:round/>
+            <a:headEnd type="none" w="sm" len="sm"/>
+            <a:tailEnd type="none" w="sm" len="sm"/>
+          </a:ln>
+        </p:spPr>
+      </p:sp>
+      <p:sp>
+        <p:nvSpPr>
+          <p:cNvPr id="237" name="Google Shape;237;p20:notes"/>
+          <p:cNvSpPr txBox="1">
+            <a:spLocks noGrp="1"/>
+          </p:cNvSpPr>
+          <p:nvPr>
+            <p:ph type="body" idx="1"/>
+          </p:nvPr>
+        </p:nvSpPr>
+        <p:spPr>
+          <a:xfrm>
+            <a:off x="685800" y="4343400"/>
+            <a:ext cx="5486400" cy="4114800"/>
+          </a:xfrm>
+          <a:prstGeom prst="rect">
+            <a:avLst/>
+          </a:prstGeom>
+          <a:noFill/>
+          <a:ln>
+            <a:noFill/>
+          </a:ln>
+        </p:spPr>
+        <p:txBody>
+          <a:bodyPr spcFirstLastPara="1" wrap="square" lIns="91425" tIns="91425" rIns="91425" bIns="91425" anchor="t" anchorCtr="0">
+            <a:noAutofit/>
+          </a:bodyPr>
+          <a:lstStyle/>
+          <a:p>
+            <a:pPr marL="0" lvl="0" indent="0" algn="l" rtl="0">
+              <a:lnSpc>
+                <a:spcPct val="100000"/>
+              </a:lnSpc>
+              <a:spcBef>
+                <a:spcPts val="0"/>
+              </a:spcBef>
+              <a:spcAft>
+                <a:spcPts val="0"/>
+              </a:spcAft>
+              <a:buSzPts val="1100"/>
+              <a:buNone/>
+            </a:pPr>
+            <a:endParaRPr/>
+          </a:p>
+        </p:txBody>
+      </p:sp>
+    </p:spTree>
+  </p:cSld>
+  <p:clrMapOvr>
+    <a:masterClrMapping/>
+  </p:clrMapOvr>
+</p:notes>
+</file>
+
+<file path=ppt/notesSlides/notesSlide41.xml><?xml version="1.0" encoding="utf-8"?>
+<p:notes xmlns:a="http://schemas.openxmlformats.org/drawingml/2006/main" xmlns:r="http://schemas.openxmlformats.org/officeDocument/2006/relationships" xmlns:p="http://schemas.openxmlformats.org/presentationml/2006/main" showMasterSp="0" showMasterPhAnim="0">
+  <p:cSld>
+    <p:spTree>
+      <p:nvGrpSpPr>
+        <p:cNvPr id="1" name="Shape 242"/>
+        <p:cNvGrpSpPr/>
+        <p:nvPr/>
+      </p:nvGrpSpPr>
+      <p:grpSpPr>
+        <a:xfrm>
+          <a:off x="0" y="0"/>
+          <a:ext cx="0" cy="0"/>
+          <a:chOff x="0" y="0"/>
+          <a:chExt cx="0" cy="0"/>
+        </a:xfrm>
+      </p:grpSpPr>
+      <p:sp>
+        <p:nvSpPr>
+          <p:cNvPr id="243" name="Google Shape;243;g385ad5efec9_0_2:notes"/>
+          <p:cNvSpPr>
+            <a:spLocks noGrp="1" noRot="1" noChangeAspect="1"/>
+          </p:cNvSpPr>
+          <p:nvPr>
+            <p:ph type="sldImg" idx="2"/>
+          </p:nvPr>
+        </p:nvSpPr>
+        <p:spPr>
+          <a:xfrm>
+            <a:off x="381000" y="685800"/>
+            <a:ext cx="6096000" cy="3429000"/>
+          </a:xfrm>
+          <a:custGeom>
+            <a:avLst/>
+            <a:gdLst/>
+            <a:ahLst/>
+            <a:cxnLst/>
+            <a:rect l="l" t="t" r="r" b="b"/>
+            <a:pathLst>
+              <a:path w="120000" h="120000" extrusionOk="0">
+                <a:moveTo>
+                  <a:pt x="0" y="0"/>
+                </a:moveTo>
+                <a:lnTo>
+                  <a:pt x="120000" y="0"/>
+                </a:lnTo>
+                <a:lnTo>
+                  <a:pt x="120000" y="120000"/>
+                </a:lnTo>
+                <a:lnTo>
+                  <a:pt x="0" y="120000"/>
+                </a:lnTo>
+                <a:close/>
+              </a:path>
+            </a:pathLst>
+          </a:custGeom>
+          <a:noFill/>
+          <a:ln w="9525" cap="flat" cmpd="sng">
+            <a:solidFill>
+              <a:srgbClr val="000000"/>
+            </a:solidFill>
+            <a:prstDash val="solid"/>
+            <a:round/>
+            <a:headEnd type="none" w="sm" len="sm"/>
+            <a:tailEnd type="none" w="sm" len="sm"/>
+          </a:ln>
+        </p:spPr>
+      </p:sp>
+      <p:sp>
+        <p:nvSpPr>
+          <p:cNvPr id="244" name="Google Shape;244;g385ad5efec9_0_2:notes"/>
+          <p:cNvSpPr txBox="1">
+            <a:spLocks noGrp="1"/>
+          </p:cNvSpPr>
+          <p:nvPr>
+            <p:ph type="body" idx="1"/>
+          </p:nvPr>
+        </p:nvSpPr>
+        <p:spPr>
+          <a:xfrm>
+            <a:off x="685800" y="4343400"/>
+            <a:ext cx="5486400" cy="4114800"/>
+          </a:xfrm>
+          <a:prstGeom prst="rect">
+            <a:avLst/>
+          </a:prstGeom>
+          <a:noFill/>
+          <a:ln>
+            <a:noFill/>
+          </a:ln>
+        </p:spPr>
+        <p:txBody>
+          <a:bodyPr spcFirstLastPara="1" wrap="square" lIns="91425" tIns="91425" rIns="91425" bIns="91425" anchor="t" anchorCtr="0">
+            <a:noAutofit/>
+          </a:bodyPr>
+          <a:lstStyle/>
+          <a:p>
+            <a:pPr marL="0" lvl="0" indent="0" algn="l" rtl="0">
+              <a:lnSpc>
+                <a:spcPct val="100000"/>
+              </a:lnSpc>
+              <a:spcBef>
+                <a:spcPts val="0"/>
+              </a:spcBef>
+              <a:spcAft>
+                <a:spcPts val="0"/>
+              </a:spcAft>
+              <a:buSzPts val="1100"/>
+              <a:buNone/>
+            </a:pPr>
+            <a:endParaRPr/>
+          </a:p>
+        </p:txBody>
+      </p:sp>
+    </p:spTree>
+  </p:cSld>
+  <p:clrMapOvr>
+    <a:masterClrMapping/>
+  </p:clrMapOvr>
+</p:notes>
+</file>
+
+<file path=ppt/notesSlides/notesSlide42.xml><?xml version="1.0" encoding="utf-8"?>
+<p:notes xmlns:a="http://schemas.openxmlformats.org/drawingml/2006/main" xmlns:r="http://schemas.openxmlformats.org/officeDocument/2006/relationships" xmlns:p="http://schemas.openxmlformats.org/presentationml/2006/main" showMasterSp="0" showMasterPhAnim="0">
+  <p:cSld>
+    <p:spTree>
+      <p:nvGrpSpPr>
         <p:cNvPr id="1" name="Shape 249"/>
         <p:cNvGrpSpPr/>
         <p:nvPr/>
@@ -5555,7 +5847,7 @@
 </p:notes>
 </file>
 
-<file path=ppt/notesSlides/notesSlide41.xml><?xml version="1.0" encoding="utf-8"?>
+<file path=ppt/notesSlides/notesSlide43.xml><?xml version="1.0" encoding="utf-8"?>
 <p:notes xmlns:a="http://schemas.openxmlformats.org/drawingml/2006/main" xmlns:r="http://schemas.openxmlformats.org/officeDocument/2006/relationships" xmlns:p="http://schemas.openxmlformats.org/presentationml/2006/main" showMasterSp="0" showMasterPhAnim="0">
   <p:cSld>
     <p:spTree>
@@ -5677,7 +5969,7 @@
 </p:notes>
 </file>
 
-<file path=ppt/notesSlides/notesSlide42.xml><?xml version="1.0" encoding="utf-8"?>
+<file path=ppt/notesSlides/notesSlide44.xml><?xml version="1.0" encoding="utf-8"?>
 <p:notes xmlns:a="http://schemas.openxmlformats.org/drawingml/2006/main" xmlns:r="http://schemas.openxmlformats.org/officeDocument/2006/relationships" xmlns:p="http://schemas.openxmlformats.org/presentationml/2006/main" showMasterSp="0" showMasterPhAnim="0">
   <p:cSld>
     <p:spTree>
@@ -5799,7 +6091,7 @@
 </p:notes>
 </file>
 
-<file path=ppt/notesSlides/notesSlide43.xml><?xml version="1.0" encoding="utf-8"?>
+<file path=ppt/notesSlides/notesSlide45.xml><?xml version="1.0" encoding="utf-8"?>
 <p:notes xmlns:a="http://schemas.openxmlformats.org/drawingml/2006/main" xmlns:r="http://schemas.openxmlformats.org/officeDocument/2006/relationships" xmlns:p="http://schemas.openxmlformats.org/presentationml/2006/main" showMasterSp="0" showMasterPhAnim="0">
   <p:cSld>
     <p:spTree>
@@ -5921,7 +6213,7 @@
 </p:notes>
 </file>
 
-<file path=ppt/notesSlides/notesSlide44.xml><?xml version="1.0" encoding="utf-8"?>
+<file path=ppt/notesSlides/notesSlide46.xml><?xml version="1.0" encoding="utf-8"?>
 <p:notes xmlns:a="http://schemas.openxmlformats.org/drawingml/2006/main" xmlns:r="http://schemas.openxmlformats.org/officeDocument/2006/relationships" xmlns:p="http://schemas.openxmlformats.org/presentationml/2006/main" showMasterSp="0" showMasterPhAnim="0">
   <p:cSld>
     <p:spTree>
@@ -6091,7 +6383,7 @@
                 <a:cs typeface="Calibri"/>
                 <a:sym typeface="Calibri"/>
               </a:rPr>
-              <a:t>47</a:t>
+              <a:t>49</a:t>
             </a:fld>
             <a:endParaRPr sz="1200" b="0" i="0" u="none" strike="noStrike" cap="none">
               <a:solidFill>
@@ -40822,6 +41114,1138 @@
         <p:cNvPr id="1" name="Shape 187">
           <a:extLst>
             <a:ext uri="{FF2B5EF4-FFF2-40B4-BE49-F238E27FC236}">
+              <a16:creationId xmlns:a16="http://schemas.microsoft.com/office/drawing/2014/main" id="{CA278AA5-0C44-AF03-0959-E61B63332E20}"/>
+            </a:ext>
+          </a:extLst>
+        </p:cNvPr>
+        <p:cNvGrpSpPr/>
+        <p:nvPr/>
+      </p:nvGrpSpPr>
+      <p:grpSpPr>
+        <a:xfrm>
+          <a:off x="0" y="0"/>
+          <a:ext cx="0" cy="0"/>
+          <a:chOff x="0" y="0"/>
+          <a:chExt cx="0" cy="0"/>
+        </a:xfrm>
+      </p:grpSpPr>
+      <p:sp>
+        <p:nvSpPr>
+          <p:cNvPr id="188" name="Google Shape;188;p40">
+            <a:extLst>
+              <a:ext uri="{FF2B5EF4-FFF2-40B4-BE49-F238E27FC236}">
+                <a16:creationId xmlns:a16="http://schemas.microsoft.com/office/drawing/2014/main" id="{F738667D-EC9F-A0F0-802F-6B059E8514A0}"/>
+              </a:ext>
+            </a:extLst>
+          </p:cNvPr>
+          <p:cNvSpPr txBox="1"/>
+          <p:nvPr/>
+        </p:nvSpPr>
+        <p:spPr>
+          <a:xfrm>
+            <a:off x="468977" y="92417"/>
+            <a:ext cx="8520600" cy="572700"/>
+          </a:xfrm>
+          <a:prstGeom prst="rect">
+            <a:avLst/>
+          </a:prstGeom>
+          <a:noFill/>
+          <a:ln>
+            <a:noFill/>
+          </a:ln>
+        </p:spPr>
+        <p:txBody>
+          <a:bodyPr spcFirstLastPara="1" wrap="square" lIns="91425" tIns="91425" rIns="91425" bIns="91425" anchor="t" anchorCtr="0">
+            <a:noAutofit/>
+          </a:bodyPr>
+          <a:lstStyle/>
+          <a:p>
+            <a:pPr marL="0" marR="0" lvl="0" indent="0" algn="l" rtl="0">
+              <a:lnSpc>
+                <a:spcPct val="100000"/>
+              </a:lnSpc>
+              <a:spcBef>
+                <a:spcPts val="0"/>
+              </a:spcBef>
+              <a:spcAft>
+                <a:spcPts val="0"/>
+              </a:spcAft>
+              <a:buClr>
+                <a:srgbClr val="000000"/>
+              </a:buClr>
+              <a:buSzPts val="2200"/>
+              <a:buFont typeface="Arial"/>
+              <a:buNone/>
+            </a:pPr>
+            <a:r>
+              <a:rPr lang="en-US" sz="2200" b="1" i="0" u="none" strike="noStrike" cap="none" dirty="0">
+                <a:solidFill>
+                  <a:schemeClr val="lt2"/>
+                </a:solidFill>
+                <a:latin typeface="Century Gothic"/>
+                <a:ea typeface="Century Gothic"/>
+                <a:cs typeface="Century Gothic"/>
+                <a:sym typeface="Century Gothic"/>
+              </a:rPr>
+              <a:t>Initial Exploratory Data Analysis (EDA)</a:t>
+            </a:r>
+            <a:endParaRPr sz="2200" b="1" i="0" u="none" strike="noStrike" cap="none" dirty="0">
+              <a:solidFill>
+                <a:schemeClr val="lt2"/>
+              </a:solidFill>
+              <a:latin typeface="Century Gothic"/>
+              <a:ea typeface="Century Gothic"/>
+              <a:cs typeface="Century Gothic"/>
+              <a:sym typeface="Century Gothic"/>
+            </a:endParaRPr>
+          </a:p>
+        </p:txBody>
+      </p:sp>
+      <p:sp>
+        <p:nvSpPr>
+          <p:cNvPr id="2" name="Slide Number Placeholder 1">
+            <a:extLst>
+              <a:ext uri="{FF2B5EF4-FFF2-40B4-BE49-F238E27FC236}">
+                <a16:creationId xmlns:a16="http://schemas.microsoft.com/office/drawing/2014/main" id="{DA4969C8-9EA9-9040-FC7E-F8A13F3155AD}"/>
+              </a:ext>
+            </a:extLst>
+          </p:cNvPr>
+          <p:cNvSpPr>
+            <a:spLocks noGrp="1"/>
+          </p:cNvSpPr>
+          <p:nvPr>
+            <p:ph type="sldNum" idx="12"/>
+          </p:nvPr>
+        </p:nvSpPr>
+        <p:spPr/>
+        <p:txBody>
+          <a:bodyPr/>
+          <a:lstStyle/>
+          <a:p>
+            <a:pPr marL="0" lvl="0" indent="0" algn="ctr" rtl="0">
+              <a:spcBef>
+                <a:spcPts val="0"/>
+              </a:spcBef>
+              <a:spcAft>
+                <a:spcPts val="0"/>
+              </a:spcAft>
+              <a:buNone/>
+            </a:pPr>
+            <a:fld id="{00000000-1234-1234-1234-123412341234}" type="slidenum">
+              <a:rPr lang="en-US" smtClean="0"/>
+              <a:t>32</a:t>
+            </a:fld>
+            <a:endParaRPr lang="en-US"/>
+          </a:p>
+        </p:txBody>
+      </p:sp>
+      <p:pic>
+        <p:nvPicPr>
+          <p:cNvPr id="4" name="Picture 3" descr="A group of graphs showing different sizes and colors&#10;&#10;AI-generated content may be incorrect.">
+            <a:extLst>
+              <a:ext uri="{FF2B5EF4-FFF2-40B4-BE49-F238E27FC236}">
+                <a16:creationId xmlns:a16="http://schemas.microsoft.com/office/drawing/2014/main" id="{D8AB1660-E972-0EF5-C744-0BF2D50E919B}"/>
+              </a:ext>
+            </a:extLst>
+          </p:cNvPr>
+          <p:cNvPicPr>
+            <a:picLocks noChangeAspect="1"/>
+          </p:cNvPicPr>
+          <p:nvPr/>
+        </p:nvPicPr>
+        <p:blipFill>
+          <a:blip r:embed="rId3"/>
+          <a:stretch>
+            <a:fillRect/>
+          </a:stretch>
+        </p:blipFill>
+        <p:spPr>
+          <a:xfrm>
+            <a:off x="1033113" y="610571"/>
+            <a:ext cx="6937575" cy="4286717"/>
+          </a:xfrm>
+          <a:prstGeom prst="rect">
+            <a:avLst/>
+          </a:prstGeom>
+        </p:spPr>
+      </p:pic>
+    </p:spTree>
+    <p:extLst>
+      <p:ext uri="{BB962C8B-B14F-4D97-AF65-F5344CB8AC3E}">
+        <p14:creationId xmlns:p14="http://schemas.microsoft.com/office/powerpoint/2010/main" val="1858809601"/>
+      </p:ext>
+    </p:extLst>
+  </p:cSld>
+  <p:clrMapOvr>
+    <a:masterClrMapping/>
+  </p:clrMapOvr>
+</p:sld>
+</file>
+
+<file path=ppt/slides/slide33.xml><?xml version="1.0" encoding="utf-8"?>
+<p:sld xmlns:a="http://schemas.openxmlformats.org/drawingml/2006/main" xmlns:r="http://schemas.openxmlformats.org/officeDocument/2006/relationships" xmlns:p="http://schemas.openxmlformats.org/presentationml/2006/main">
+  <p:cSld>
+    <p:spTree>
+      <p:nvGrpSpPr>
+        <p:cNvPr id="1" name="Shape 187">
+          <a:extLst>
+            <a:ext uri="{FF2B5EF4-FFF2-40B4-BE49-F238E27FC236}">
+              <a16:creationId xmlns:a16="http://schemas.microsoft.com/office/drawing/2014/main" id="{6BFCC694-81EA-FF02-4F4F-F0E598CB748B}"/>
+            </a:ext>
+          </a:extLst>
+        </p:cNvPr>
+        <p:cNvGrpSpPr/>
+        <p:nvPr/>
+      </p:nvGrpSpPr>
+      <p:grpSpPr>
+        <a:xfrm>
+          <a:off x="0" y="0"/>
+          <a:ext cx="0" cy="0"/>
+          <a:chOff x="0" y="0"/>
+          <a:chExt cx="0" cy="0"/>
+        </a:xfrm>
+      </p:grpSpPr>
+      <p:sp>
+        <p:nvSpPr>
+          <p:cNvPr id="188" name="Google Shape;188;p40">
+            <a:extLst>
+              <a:ext uri="{FF2B5EF4-FFF2-40B4-BE49-F238E27FC236}">
+                <a16:creationId xmlns:a16="http://schemas.microsoft.com/office/drawing/2014/main" id="{7F080ECC-6526-7E69-A7EF-C1EA3FED2097}"/>
+              </a:ext>
+            </a:extLst>
+          </p:cNvPr>
+          <p:cNvSpPr txBox="1"/>
+          <p:nvPr/>
+        </p:nvSpPr>
+        <p:spPr>
+          <a:xfrm>
+            <a:off x="468977" y="92417"/>
+            <a:ext cx="8520600" cy="572700"/>
+          </a:xfrm>
+          <a:prstGeom prst="rect">
+            <a:avLst/>
+          </a:prstGeom>
+          <a:noFill/>
+          <a:ln>
+            <a:noFill/>
+          </a:ln>
+        </p:spPr>
+        <p:txBody>
+          <a:bodyPr spcFirstLastPara="1" wrap="square" lIns="91425" tIns="91425" rIns="91425" bIns="91425" anchor="t" anchorCtr="0">
+            <a:noAutofit/>
+          </a:bodyPr>
+          <a:lstStyle/>
+          <a:p>
+            <a:pPr marL="0" marR="0" lvl="0" indent="0" algn="l" rtl="0">
+              <a:lnSpc>
+                <a:spcPct val="100000"/>
+              </a:lnSpc>
+              <a:spcBef>
+                <a:spcPts val="0"/>
+              </a:spcBef>
+              <a:spcAft>
+                <a:spcPts val="0"/>
+              </a:spcAft>
+              <a:buClr>
+                <a:srgbClr val="000000"/>
+              </a:buClr>
+              <a:buSzPts val="2200"/>
+              <a:buFont typeface="Arial"/>
+              <a:buNone/>
+            </a:pPr>
+            <a:r>
+              <a:rPr lang="en-US" sz="2200" b="1" i="0" u="none" strike="noStrike" cap="none" dirty="0">
+                <a:solidFill>
+                  <a:schemeClr val="lt2"/>
+                </a:solidFill>
+                <a:latin typeface="Century Gothic"/>
+                <a:ea typeface="Century Gothic"/>
+                <a:cs typeface="Century Gothic"/>
+                <a:sym typeface="Century Gothic"/>
+              </a:rPr>
+              <a:t>Initial Exploratory Data Analysis (EDA)</a:t>
+            </a:r>
+            <a:endParaRPr sz="2200" b="1" i="0" u="none" strike="noStrike" cap="none" dirty="0">
+              <a:solidFill>
+                <a:schemeClr val="lt2"/>
+              </a:solidFill>
+              <a:latin typeface="Century Gothic"/>
+              <a:ea typeface="Century Gothic"/>
+              <a:cs typeface="Century Gothic"/>
+              <a:sym typeface="Century Gothic"/>
+            </a:endParaRPr>
+          </a:p>
+        </p:txBody>
+      </p:sp>
+      <p:sp>
+        <p:nvSpPr>
+          <p:cNvPr id="190" name="Google Shape;190;p40">
+            <a:extLst>
+              <a:ext uri="{FF2B5EF4-FFF2-40B4-BE49-F238E27FC236}">
+                <a16:creationId xmlns:a16="http://schemas.microsoft.com/office/drawing/2014/main" id="{C69C2CA2-88E4-C461-ED30-1857B546F4F4}"/>
+              </a:ext>
+            </a:extLst>
+          </p:cNvPr>
+          <p:cNvSpPr txBox="1">
+            <a:spLocks noGrp="1"/>
+          </p:cNvSpPr>
+          <p:nvPr>
+            <p:ph type="body" idx="1"/>
+          </p:nvPr>
+        </p:nvSpPr>
+        <p:spPr>
+          <a:xfrm>
+            <a:off x="0" y="3235808"/>
+            <a:ext cx="4556303" cy="1766607"/>
+          </a:xfrm>
+          <a:prstGeom prst="rect">
+            <a:avLst/>
+          </a:prstGeom>
+          <a:noFill/>
+          <a:ln>
+            <a:noFill/>
+          </a:ln>
+        </p:spPr>
+        <p:txBody>
+          <a:bodyPr spcFirstLastPara="1" wrap="square" lIns="91425" tIns="91425" rIns="91425" bIns="91425" anchor="t" anchorCtr="0">
+            <a:spAutoFit/>
+          </a:bodyPr>
+          <a:lstStyle/>
+          <a:p>
+            <a:pPr marL="171450" indent="-171450" algn="just">
+              <a:spcBef>
+                <a:spcPts val="400"/>
+              </a:spcBef>
+              <a:buClr>
+                <a:schemeClr val="dk1"/>
+              </a:buClr>
+              <a:buSzPts val="1400"/>
+            </a:pPr>
+            <a:r>
+              <a:rPr lang="en-US" sz="1200" b="1" dirty="0">
+                <a:solidFill>
+                  <a:schemeClr val="dk1"/>
+                </a:solidFill>
+                <a:latin typeface="Nunito" pitchFamily="2" charset="0"/>
+                <a:ea typeface="Century Gothic"/>
+                <a:cs typeface="Century Gothic"/>
+                <a:sym typeface="Century Gothic"/>
+              </a:rPr>
+              <a:t>LOAN</a:t>
+            </a:r>
+            <a:r>
+              <a:rPr lang="en-US" sz="1200" dirty="0">
+                <a:solidFill>
+                  <a:schemeClr val="dk1"/>
+                </a:solidFill>
+                <a:latin typeface="Nunito" pitchFamily="2" charset="0"/>
+                <a:ea typeface="Century Gothic"/>
+                <a:cs typeface="Century Gothic"/>
+                <a:sym typeface="Century Gothic"/>
+              </a:rPr>
+              <a:t> – Perfect normal distribution, minimal skew</a:t>
+            </a:r>
+          </a:p>
+          <a:p>
+            <a:pPr marL="171450" indent="-171450" algn="just">
+              <a:spcBef>
+                <a:spcPts val="400"/>
+              </a:spcBef>
+              <a:buClr>
+                <a:schemeClr val="dk1"/>
+              </a:buClr>
+              <a:buSzPts val="1400"/>
+            </a:pPr>
+            <a:r>
+              <a:rPr lang="en-US" sz="1200" b="1" dirty="0">
+                <a:solidFill>
+                  <a:schemeClr val="dk1"/>
+                </a:solidFill>
+                <a:latin typeface="Nunito" pitchFamily="2" charset="0"/>
+                <a:ea typeface="Century Gothic"/>
+                <a:cs typeface="Century Gothic"/>
+                <a:sym typeface="Century Gothic"/>
+              </a:rPr>
+              <a:t>MORTDUE</a:t>
+            </a:r>
+            <a:r>
+              <a:rPr lang="en-US" sz="1200" dirty="0">
+                <a:solidFill>
+                  <a:schemeClr val="dk1"/>
+                </a:solidFill>
+                <a:latin typeface="Nunito" pitchFamily="2" charset="0"/>
+                <a:ea typeface="Century Gothic"/>
+                <a:cs typeface="Century Gothic"/>
+                <a:sym typeface="Century Gothic"/>
+              </a:rPr>
+              <a:t> – Perfect normal distribution, minimal skew</a:t>
+            </a:r>
+          </a:p>
+          <a:p>
+            <a:pPr marL="171450" indent="-171450" algn="just">
+              <a:spcBef>
+                <a:spcPts val="400"/>
+              </a:spcBef>
+              <a:buClr>
+                <a:schemeClr val="dk1"/>
+              </a:buClr>
+              <a:buSzPts val="1400"/>
+            </a:pPr>
+            <a:r>
+              <a:rPr lang="en-US" sz="1200" b="1" dirty="0">
+                <a:solidFill>
+                  <a:schemeClr val="dk1"/>
+                </a:solidFill>
+                <a:latin typeface="Nunito" pitchFamily="2" charset="0"/>
+                <a:ea typeface="Century Gothic"/>
+                <a:cs typeface="Century Gothic"/>
+                <a:sym typeface="Century Gothic"/>
+              </a:rPr>
+              <a:t>VALUE</a:t>
+            </a:r>
+            <a:r>
+              <a:rPr lang="en-US" sz="1200" dirty="0">
+                <a:solidFill>
+                  <a:schemeClr val="dk1"/>
+                </a:solidFill>
+                <a:latin typeface="Nunito" pitchFamily="2" charset="0"/>
+                <a:ea typeface="Century Gothic"/>
+                <a:cs typeface="Century Gothic"/>
+                <a:sym typeface="Century Gothic"/>
+              </a:rPr>
+              <a:t> – Close to normal distribution, reduced skew/kurtosis</a:t>
+            </a:r>
+          </a:p>
+          <a:p>
+            <a:pPr marL="171450" indent="-171450" algn="just">
+              <a:spcBef>
+                <a:spcPts val="400"/>
+              </a:spcBef>
+              <a:buClr>
+                <a:schemeClr val="dk1"/>
+              </a:buClr>
+              <a:buSzPts val="1400"/>
+            </a:pPr>
+            <a:r>
+              <a:rPr lang="en-US" sz="1200" b="1" dirty="0">
+                <a:solidFill>
+                  <a:schemeClr val="dk1"/>
+                </a:solidFill>
+                <a:latin typeface="Nunito" pitchFamily="2" charset="0"/>
+                <a:ea typeface="Century Gothic"/>
+                <a:cs typeface="Century Gothic"/>
+                <a:sym typeface="Century Gothic"/>
+              </a:rPr>
+              <a:t>YOJ</a:t>
+            </a:r>
+            <a:r>
+              <a:rPr lang="en-US" sz="1200" dirty="0">
+                <a:solidFill>
+                  <a:schemeClr val="dk1"/>
+                </a:solidFill>
+                <a:latin typeface="Nunito" pitchFamily="2" charset="0"/>
+                <a:ea typeface="Century Gothic"/>
+                <a:cs typeface="Century Gothic"/>
+                <a:sym typeface="Century Gothic"/>
+              </a:rPr>
+              <a:t> – </a:t>
+            </a:r>
+            <a:r>
+              <a:rPr lang="en-US" sz="1200" dirty="0"/>
+              <a:t>Already normal but now reduced skew/kurtosis</a:t>
+            </a:r>
+            <a:endParaRPr lang="en-US" sz="1200" dirty="0">
+              <a:solidFill>
+                <a:schemeClr val="dk1"/>
+              </a:solidFill>
+              <a:latin typeface="Nunito" pitchFamily="2" charset="0"/>
+              <a:ea typeface="Century Gothic"/>
+              <a:cs typeface="Century Gothic"/>
+              <a:sym typeface="Century Gothic"/>
+            </a:endParaRPr>
+          </a:p>
+          <a:p>
+            <a:pPr marL="171450" indent="-171450" algn="just">
+              <a:spcBef>
+                <a:spcPts val="400"/>
+              </a:spcBef>
+              <a:buClr>
+                <a:schemeClr val="dk1"/>
+              </a:buClr>
+              <a:buSzPts val="1400"/>
+            </a:pPr>
+            <a:r>
+              <a:rPr lang="en-US" sz="1200" b="1" dirty="0">
+                <a:solidFill>
+                  <a:schemeClr val="dk1"/>
+                </a:solidFill>
+                <a:latin typeface="Nunito" pitchFamily="2" charset="0"/>
+                <a:ea typeface="Century Gothic"/>
+                <a:cs typeface="Century Gothic"/>
+                <a:sym typeface="Century Gothic"/>
+              </a:rPr>
+              <a:t>DROG</a:t>
+            </a:r>
+            <a:r>
+              <a:rPr lang="en-US" sz="1200" dirty="0">
+                <a:solidFill>
+                  <a:schemeClr val="dk1"/>
+                </a:solidFill>
+                <a:latin typeface="Nunito" pitchFamily="2" charset="0"/>
+                <a:ea typeface="Century Gothic"/>
+                <a:cs typeface="Century Gothic"/>
+                <a:sym typeface="Century Gothic"/>
+              </a:rPr>
+              <a:t> – Zero inflated, binarize?</a:t>
+            </a:r>
+          </a:p>
+          <a:p>
+            <a:pPr marL="0" indent="0" algn="just">
+              <a:spcBef>
+                <a:spcPts val="400"/>
+              </a:spcBef>
+              <a:buClr>
+                <a:schemeClr val="dk1"/>
+              </a:buClr>
+              <a:buSzPts val="1400"/>
+              <a:buNone/>
+            </a:pPr>
+            <a:endParaRPr lang="en-US" sz="1200" dirty="0">
+              <a:solidFill>
+                <a:schemeClr val="dk1"/>
+              </a:solidFill>
+              <a:latin typeface="Nunito" pitchFamily="2" charset="0"/>
+              <a:ea typeface="Century Gothic"/>
+              <a:cs typeface="Century Gothic"/>
+              <a:sym typeface="Century Gothic"/>
+            </a:endParaRPr>
+          </a:p>
+        </p:txBody>
+      </p:sp>
+      <p:sp>
+        <p:nvSpPr>
+          <p:cNvPr id="2" name="Slide Number Placeholder 1">
+            <a:extLst>
+              <a:ext uri="{FF2B5EF4-FFF2-40B4-BE49-F238E27FC236}">
+                <a16:creationId xmlns:a16="http://schemas.microsoft.com/office/drawing/2014/main" id="{AD9AB37F-8DEF-7D1F-7469-57E038BC2018}"/>
+              </a:ext>
+            </a:extLst>
+          </p:cNvPr>
+          <p:cNvSpPr>
+            <a:spLocks noGrp="1"/>
+          </p:cNvSpPr>
+          <p:nvPr>
+            <p:ph type="sldNum" idx="12"/>
+          </p:nvPr>
+        </p:nvSpPr>
+        <p:spPr/>
+        <p:txBody>
+          <a:bodyPr/>
+          <a:lstStyle/>
+          <a:p>
+            <a:pPr marL="0" lvl="0" indent="0" algn="ctr" rtl="0">
+              <a:spcBef>
+                <a:spcPts val="0"/>
+              </a:spcBef>
+              <a:spcAft>
+                <a:spcPts val="0"/>
+              </a:spcAft>
+              <a:buNone/>
+            </a:pPr>
+            <a:fld id="{00000000-1234-1234-1234-123412341234}" type="slidenum">
+              <a:rPr lang="en-US" smtClean="0"/>
+              <a:t>33</a:t>
+            </a:fld>
+            <a:endParaRPr lang="en-US"/>
+          </a:p>
+        </p:txBody>
+      </p:sp>
+      <p:sp>
+        <p:nvSpPr>
+          <p:cNvPr id="7" name="Google Shape;190;p40">
+            <a:extLst>
+              <a:ext uri="{FF2B5EF4-FFF2-40B4-BE49-F238E27FC236}">
+                <a16:creationId xmlns:a16="http://schemas.microsoft.com/office/drawing/2014/main" id="{CCDDB7F7-AD2A-772E-27CE-6E6E5E8F9341}"/>
+              </a:ext>
+            </a:extLst>
+          </p:cNvPr>
+          <p:cNvSpPr txBox="1">
+            <a:spLocks/>
+          </p:cNvSpPr>
+          <p:nvPr/>
+        </p:nvSpPr>
+        <p:spPr>
+          <a:xfrm>
+            <a:off x="4587698" y="3284476"/>
+            <a:ext cx="4513291" cy="1766607"/>
+          </a:xfrm>
+          <a:prstGeom prst="rect">
+            <a:avLst/>
+          </a:prstGeom>
+          <a:noFill/>
+          <a:ln>
+            <a:noFill/>
+          </a:ln>
+        </p:spPr>
+        <p:txBody>
+          <a:bodyPr spcFirstLastPara="1" wrap="square" lIns="91425" tIns="91425" rIns="91425" bIns="91425" anchor="t" anchorCtr="0">
+            <a:spAutoFit/>
+          </a:bodyPr>
+          <a:lstStyle>
+            <a:defPPr marR="0" lvl="0" algn="l" rtl="0">
+              <a:lnSpc>
+                <a:spcPct val="100000"/>
+              </a:lnSpc>
+              <a:spcBef>
+                <a:spcPts val="0"/>
+              </a:spcBef>
+              <a:spcAft>
+                <a:spcPts val="0"/>
+              </a:spcAft>
+            </a:defPPr>
+            <a:lvl1pPr marL="457200" marR="0" lvl="0" indent="-323850" algn="l" rtl="0">
+              <a:lnSpc>
+                <a:spcPct val="115000"/>
+              </a:lnSpc>
+              <a:spcBef>
+                <a:spcPts val="0"/>
+              </a:spcBef>
+              <a:spcAft>
+                <a:spcPts val="0"/>
+              </a:spcAft>
+              <a:buClr>
+                <a:schemeClr val="dk2"/>
+              </a:buClr>
+              <a:buSzPts val="1500"/>
+              <a:buFont typeface="Nunito"/>
+              <a:buChar char="●"/>
+              <a:defRPr sz="1500" b="0" i="0" u="none" strike="noStrike" cap="none">
+                <a:solidFill>
+                  <a:schemeClr val="dk2"/>
+                </a:solidFill>
+                <a:latin typeface="Nunito"/>
+                <a:ea typeface="Nunito"/>
+                <a:cs typeface="Nunito"/>
+                <a:sym typeface="Nunito"/>
+              </a:defRPr>
+            </a:lvl1pPr>
+            <a:lvl2pPr marL="914400" marR="0" lvl="1" indent="-311150" algn="l" rtl="0">
+              <a:lnSpc>
+                <a:spcPct val="115000"/>
+              </a:lnSpc>
+              <a:spcBef>
+                <a:spcPts val="1600"/>
+              </a:spcBef>
+              <a:spcAft>
+                <a:spcPts val="0"/>
+              </a:spcAft>
+              <a:buClr>
+                <a:schemeClr val="dk2"/>
+              </a:buClr>
+              <a:buSzPts val="1300"/>
+              <a:buFont typeface="Nunito"/>
+              <a:buChar char="○"/>
+              <a:defRPr sz="1300" b="0" i="0" u="none" strike="noStrike" cap="none">
+                <a:solidFill>
+                  <a:schemeClr val="dk2"/>
+                </a:solidFill>
+                <a:latin typeface="Nunito"/>
+                <a:ea typeface="Nunito"/>
+                <a:cs typeface="Nunito"/>
+                <a:sym typeface="Nunito"/>
+              </a:defRPr>
+            </a:lvl2pPr>
+            <a:lvl3pPr marL="1371600" marR="0" lvl="2" indent="-304800" algn="l" rtl="0">
+              <a:lnSpc>
+                <a:spcPct val="115000"/>
+              </a:lnSpc>
+              <a:spcBef>
+                <a:spcPts val="1600"/>
+              </a:spcBef>
+              <a:spcAft>
+                <a:spcPts val="0"/>
+              </a:spcAft>
+              <a:buClr>
+                <a:schemeClr val="dk2"/>
+              </a:buClr>
+              <a:buSzPts val="1200"/>
+              <a:buFont typeface="Nunito"/>
+              <a:buChar char="■"/>
+              <a:defRPr sz="1200" b="0" i="0" u="none" strike="noStrike" cap="none">
+                <a:solidFill>
+                  <a:schemeClr val="dk2"/>
+                </a:solidFill>
+                <a:latin typeface="Nunito"/>
+                <a:ea typeface="Nunito"/>
+                <a:cs typeface="Nunito"/>
+                <a:sym typeface="Nunito"/>
+              </a:defRPr>
+            </a:lvl3pPr>
+            <a:lvl4pPr marL="1828800" marR="0" lvl="3" indent="-298450" algn="l" rtl="0">
+              <a:lnSpc>
+                <a:spcPct val="115000"/>
+              </a:lnSpc>
+              <a:spcBef>
+                <a:spcPts val="1600"/>
+              </a:spcBef>
+              <a:spcAft>
+                <a:spcPts val="0"/>
+              </a:spcAft>
+              <a:buClr>
+                <a:schemeClr val="dk2"/>
+              </a:buClr>
+              <a:buSzPts val="1100"/>
+              <a:buFont typeface="Nunito"/>
+              <a:buChar char="●"/>
+              <a:defRPr sz="1100" b="0" i="0" u="none" strike="noStrike" cap="none">
+                <a:solidFill>
+                  <a:schemeClr val="dk2"/>
+                </a:solidFill>
+                <a:latin typeface="Nunito"/>
+                <a:ea typeface="Nunito"/>
+                <a:cs typeface="Nunito"/>
+                <a:sym typeface="Nunito"/>
+              </a:defRPr>
+            </a:lvl4pPr>
+            <a:lvl5pPr marL="2286000" marR="0" lvl="4" indent="-292100" algn="l" rtl="0">
+              <a:lnSpc>
+                <a:spcPct val="115000"/>
+              </a:lnSpc>
+              <a:spcBef>
+                <a:spcPts val="1600"/>
+              </a:spcBef>
+              <a:spcAft>
+                <a:spcPts val="0"/>
+              </a:spcAft>
+              <a:buClr>
+                <a:schemeClr val="dk2"/>
+              </a:buClr>
+              <a:buSzPts val="1000"/>
+              <a:buFont typeface="Nunito"/>
+              <a:buChar char="○"/>
+              <a:defRPr sz="1000" b="0" i="0" u="none" strike="noStrike" cap="none">
+                <a:solidFill>
+                  <a:schemeClr val="dk2"/>
+                </a:solidFill>
+                <a:latin typeface="Nunito"/>
+                <a:ea typeface="Nunito"/>
+                <a:cs typeface="Nunito"/>
+                <a:sym typeface="Nunito"/>
+              </a:defRPr>
+            </a:lvl5pPr>
+            <a:lvl6pPr marL="2743200" marR="0" lvl="5" indent="-285750" algn="l" rtl="0">
+              <a:lnSpc>
+                <a:spcPct val="115000"/>
+              </a:lnSpc>
+              <a:spcBef>
+                <a:spcPts val="1600"/>
+              </a:spcBef>
+              <a:spcAft>
+                <a:spcPts val="0"/>
+              </a:spcAft>
+              <a:buClr>
+                <a:schemeClr val="dk2"/>
+              </a:buClr>
+              <a:buSzPts val="900"/>
+              <a:buFont typeface="Nunito"/>
+              <a:buChar char="■"/>
+              <a:defRPr sz="900" b="0" i="0" u="none" strike="noStrike" cap="none">
+                <a:solidFill>
+                  <a:schemeClr val="dk2"/>
+                </a:solidFill>
+                <a:latin typeface="Nunito"/>
+                <a:ea typeface="Nunito"/>
+                <a:cs typeface="Nunito"/>
+                <a:sym typeface="Nunito"/>
+              </a:defRPr>
+            </a:lvl6pPr>
+            <a:lvl7pPr marL="3200400" marR="0" lvl="6" indent="-279400" algn="l" rtl="0">
+              <a:lnSpc>
+                <a:spcPct val="115000"/>
+              </a:lnSpc>
+              <a:spcBef>
+                <a:spcPts val="1600"/>
+              </a:spcBef>
+              <a:spcAft>
+                <a:spcPts val="0"/>
+              </a:spcAft>
+              <a:buClr>
+                <a:schemeClr val="dk2"/>
+              </a:buClr>
+              <a:buSzPts val="800"/>
+              <a:buFont typeface="Nunito"/>
+              <a:buChar char="●"/>
+              <a:defRPr sz="800" b="0" i="0" u="none" strike="noStrike" cap="none">
+                <a:solidFill>
+                  <a:schemeClr val="dk2"/>
+                </a:solidFill>
+                <a:latin typeface="Nunito"/>
+                <a:ea typeface="Nunito"/>
+                <a:cs typeface="Nunito"/>
+                <a:sym typeface="Nunito"/>
+              </a:defRPr>
+            </a:lvl7pPr>
+            <a:lvl8pPr marL="3657600" marR="0" lvl="7" indent="-273050" algn="l" rtl="0">
+              <a:lnSpc>
+                <a:spcPct val="115000"/>
+              </a:lnSpc>
+              <a:spcBef>
+                <a:spcPts val="1600"/>
+              </a:spcBef>
+              <a:spcAft>
+                <a:spcPts val="0"/>
+              </a:spcAft>
+              <a:buClr>
+                <a:schemeClr val="dk2"/>
+              </a:buClr>
+              <a:buSzPts val="700"/>
+              <a:buFont typeface="Nunito"/>
+              <a:buChar char="○"/>
+              <a:defRPr sz="700" b="0" i="0" u="none" strike="noStrike" cap="none">
+                <a:solidFill>
+                  <a:schemeClr val="dk2"/>
+                </a:solidFill>
+                <a:latin typeface="Nunito"/>
+                <a:ea typeface="Nunito"/>
+                <a:cs typeface="Nunito"/>
+                <a:sym typeface="Nunito"/>
+              </a:defRPr>
+            </a:lvl8pPr>
+            <a:lvl9pPr marL="4114800" marR="0" lvl="8" indent="-266700" algn="l" rtl="0">
+              <a:lnSpc>
+                <a:spcPct val="115000"/>
+              </a:lnSpc>
+              <a:spcBef>
+                <a:spcPts val="1600"/>
+              </a:spcBef>
+              <a:spcAft>
+                <a:spcPts val="1600"/>
+              </a:spcAft>
+              <a:buClr>
+                <a:schemeClr val="dk2"/>
+              </a:buClr>
+              <a:buSzPts val="600"/>
+              <a:buFont typeface="Nunito"/>
+              <a:buChar char="■"/>
+              <a:defRPr sz="600" b="0" i="0" u="none" strike="noStrike" cap="none">
+                <a:solidFill>
+                  <a:schemeClr val="dk2"/>
+                </a:solidFill>
+                <a:latin typeface="Nunito"/>
+                <a:ea typeface="Nunito"/>
+                <a:cs typeface="Nunito"/>
+                <a:sym typeface="Nunito"/>
+              </a:defRPr>
+            </a:lvl9pPr>
+          </a:lstStyle>
+          <a:p>
+            <a:pPr marL="171450" indent="-171450" algn="just">
+              <a:spcBef>
+                <a:spcPts val="400"/>
+              </a:spcBef>
+              <a:buClr>
+                <a:schemeClr val="dk1"/>
+              </a:buClr>
+              <a:buSzPts val="1400"/>
+            </a:pPr>
+            <a:r>
+              <a:rPr lang="en-US" sz="1200" b="1" dirty="0">
+                <a:solidFill>
+                  <a:schemeClr val="dk1"/>
+                </a:solidFill>
+                <a:latin typeface="Nunito" pitchFamily="2" charset="0"/>
+                <a:ea typeface="Century Gothic"/>
+                <a:cs typeface="Century Gothic"/>
+                <a:sym typeface="Century Gothic"/>
+              </a:rPr>
+              <a:t>DELINQ</a:t>
+            </a:r>
+            <a:r>
+              <a:rPr lang="en-US" sz="1200" dirty="0">
+                <a:solidFill>
+                  <a:schemeClr val="dk1"/>
+                </a:solidFill>
+                <a:latin typeface="Nunito" pitchFamily="2" charset="0"/>
+                <a:ea typeface="Century Gothic"/>
+                <a:cs typeface="Century Gothic"/>
+                <a:sym typeface="Century Gothic"/>
+              </a:rPr>
+              <a:t> – Zero inflated, binarize?</a:t>
+            </a:r>
+          </a:p>
+          <a:p>
+            <a:pPr marL="171450" indent="-171450" algn="just">
+              <a:spcBef>
+                <a:spcPts val="400"/>
+              </a:spcBef>
+              <a:buClr>
+                <a:schemeClr val="dk1"/>
+              </a:buClr>
+              <a:buSzPts val="1400"/>
+            </a:pPr>
+            <a:r>
+              <a:rPr lang="en-US" sz="1200" b="1" dirty="0">
+                <a:solidFill>
+                  <a:schemeClr val="dk1"/>
+                </a:solidFill>
+                <a:latin typeface="Nunito" pitchFamily="2" charset="0"/>
+                <a:ea typeface="Century Gothic"/>
+                <a:cs typeface="Century Gothic"/>
+                <a:sym typeface="Century Gothic"/>
+              </a:rPr>
+              <a:t>CLAGE</a:t>
+            </a:r>
+            <a:r>
+              <a:rPr lang="en-US" sz="1200" dirty="0">
+                <a:solidFill>
+                  <a:schemeClr val="dk1"/>
+                </a:solidFill>
+                <a:latin typeface="Nunito" pitchFamily="2" charset="0"/>
+                <a:ea typeface="Century Gothic"/>
+                <a:cs typeface="Century Gothic"/>
+                <a:sym typeface="Century Gothic"/>
+              </a:rPr>
+              <a:t> – Normal, but bimodal? Reduced skew/kurtosis</a:t>
+            </a:r>
+          </a:p>
+          <a:p>
+            <a:pPr marL="171450" indent="-171450" algn="just">
+              <a:spcBef>
+                <a:spcPts val="400"/>
+              </a:spcBef>
+              <a:buClr>
+                <a:schemeClr val="dk1"/>
+              </a:buClr>
+              <a:buSzPts val="1400"/>
+            </a:pPr>
+            <a:r>
+              <a:rPr lang="en-US" sz="1200" b="1" dirty="0">
+                <a:solidFill>
+                  <a:schemeClr val="dk1"/>
+                </a:solidFill>
+                <a:latin typeface="Nunito" pitchFamily="2" charset="0"/>
+                <a:ea typeface="Century Gothic"/>
+                <a:cs typeface="Century Gothic"/>
+                <a:sym typeface="Century Gothic"/>
+              </a:rPr>
+              <a:t>NINQ</a:t>
+            </a:r>
+            <a:r>
+              <a:rPr lang="en-US" sz="1200" dirty="0">
+                <a:solidFill>
+                  <a:schemeClr val="dk1"/>
+                </a:solidFill>
+                <a:latin typeface="Nunito" pitchFamily="2" charset="0"/>
+                <a:ea typeface="Century Gothic"/>
+                <a:cs typeface="Century Gothic"/>
+                <a:sym typeface="Century Gothic"/>
+              </a:rPr>
+              <a:t> – Better. Reduced skew</a:t>
+            </a:r>
+            <a:r>
+              <a:rPr lang="en-US" sz="1200">
+                <a:solidFill>
+                  <a:schemeClr val="dk1"/>
+                </a:solidFill>
+                <a:latin typeface="Nunito" pitchFamily="2" charset="0"/>
+                <a:ea typeface="Century Gothic"/>
+                <a:cs typeface="Century Gothic"/>
+                <a:sym typeface="Century Gothic"/>
+              </a:rPr>
+              <a:t>/kurtosis.</a:t>
+            </a:r>
+            <a:endParaRPr lang="en-US" sz="1200" dirty="0">
+              <a:solidFill>
+                <a:schemeClr val="dk1"/>
+              </a:solidFill>
+              <a:latin typeface="Nunito" pitchFamily="2" charset="0"/>
+              <a:ea typeface="Century Gothic"/>
+              <a:cs typeface="Century Gothic"/>
+              <a:sym typeface="Century Gothic"/>
+            </a:endParaRPr>
+          </a:p>
+          <a:p>
+            <a:pPr marL="171450" indent="-171450" algn="just">
+              <a:spcBef>
+                <a:spcPts val="400"/>
+              </a:spcBef>
+              <a:buClr>
+                <a:schemeClr val="dk1"/>
+              </a:buClr>
+              <a:buSzPts val="1400"/>
+            </a:pPr>
+            <a:r>
+              <a:rPr lang="en-US" sz="1200" b="1" dirty="0">
+                <a:solidFill>
+                  <a:schemeClr val="dk1"/>
+                </a:solidFill>
+                <a:latin typeface="Nunito" pitchFamily="2" charset="0"/>
+                <a:ea typeface="Century Gothic"/>
+                <a:cs typeface="Century Gothic"/>
+                <a:sym typeface="Century Gothic"/>
+              </a:rPr>
+              <a:t>CLNO</a:t>
+            </a:r>
+            <a:r>
+              <a:rPr lang="en-US" sz="1200" dirty="0">
+                <a:solidFill>
+                  <a:schemeClr val="dk1"/>
+                </a:solidFill>
+                <a:latin typeface="Nunito" pitchFamily="2" charset="0"/>
+                <a:ea typeface="Century Gothic"/>
+                <a:cs typeface="Century Gothic"/>
+                <a:sym typeface="Century Gothic"/>
+              </a:rPr>
+              <a:t> – </a:t>
+            </a:r>
+            <a:r>
+              <a:rPr lang="en-US" sz="1200" dirty="0"/>
+              <a:t>Already normal but now reduced skew/kurtosis</a:t>
+            </a:r>
+            <a:endParaRPr lang="en-US" sz="1200" dirty="0">
+              <a:solidFill>
+                <a:schemeClr val="dk1"/>
+              </a:solidFill>
+              <a:latin typeface="Nunito" pitchFamily="2" charset="0"/>
+              <a:ea typeface="Century Gothic"/>
+              <a:cs typeface="Century Gothic"/>
+              <a:sym typeface="Century Gothic"/>
+            </a:endParaRPr>
+          </a:p>
+          <a:p>
+            <a:pPr marL="171450" indent="-171450" algn="just">
+              <a:spcBef>
+                <a:spcPts val="400"/>
+              </a:spcBef>
+              <a:buClr>
+                <a:schemeClr val="dk1"/>
+              </a:buClr>
+              <a:buSzPts val="1400"/>
+            </a:pPr>
+            <a:r>
+              <a:rPr lang="en-US" sz="1200" b="1" dirty="0">
+                <a:solidFill>
+                  <a:schemeClr val="dk1"/>
+                </a:solidFill>
+                <a:latin typeface="Nunito" pitchFamily="2" charset="0"/>
+                <a:ea typeface="Century Gothic"/>
+                <a:cs typeface="Century Gothic"/>
+                <a:sym typeface="Century Gothic"/>
+              </a:rPr>
+              <a:t>DEBTINC</a:t>
+            </a:r>
+            <a:r>
+              <a:rPr lang="en-US" sz="1200" dirty="0">
+                <a:solidFill>
+                  <a:schemeClr val="dk1"/>
+                </a:solidFill>
+                <a:latin typeface="Nunito" pitchFamily="2" charset="0"/>
+                <a:ea typeface="Century Gothic"/>
+                <a:cs typeface="Century Gothic"/>
+                <a:sym typeface="Century Gothic"/>
+              </a:rPr>
+              <a:t> – Normal-</a:t>
+            </a:r>
+            <a:r>
+              <a:rPr lang="en-US" sz="1200" dirty="0" err="1">
+                <a:solidFill>
+                  <a:schemeClr val="dk1"/>
+                </a:solidFill>
+                <a:latin typeface="Nunito" pitchFamily="2" charset="0"/>
+                <a:ea typeface="Century Gothic"/>
+                <a:cs typeface="Century Gothic"/>
+                <a:sym typeface="Century Gothic"/>
+              </a:rPr>
+              <a:t>ish</a:t>
+            </a:r>
+            <a:r>
+              <a:rPr lang="en-US" sz="1200" dirty="0">
+                <a:solidFill>
+                  <a:schemeClr val="dk1"/>
+                </a:solidFill>
+                <a:latin typeface="Nunito" pitchFamily="2" charset="0"/>
+                <a:ea typeface="Century Gothic"/>
+                <a:cs typeface="Century Gothic"/>
+                <a:sym typeface="Century Gothic"/>
+              </a:rPr>
+              <a:t>. Kurtosis reduced, but still high</a:t>
+            </a:r>
+          </a:p>
+          <a:p>
+            <a:pPr marL="0" indent="0" algn="just">
+              <a:spcBef>
+                <a:spcPts val="400"/>
+              </a:spcBef>
+              <a:buClr>
+                <a:schemeClr val="dk1"/>
+              </a:buClr>
+              <a:buSzPts val="1400"/>
+              <a:buFont typeface="Nunito"/>
+              <a:buNone/>
+            </a:pPr>
+            <a:endParaRPr lang="en-US" sz="1200" dirty="0">
+              <a:solidFill>
+                <a:schemeClr val="dk1"/>
+              </a:solidFill>
+              <a:latin typeface="Nunito" pitchFamily="2" charset="0"/>
+              <a:ea typeface="Century Gothic"/>
+              <a:cs typeface="Century Gothic"/>
+              <a:sym typeface="Century Gothic"/>
+            </a:endParaRPr>
+          </a:p>
+        </p:txBody>
+      </p:sp>
+      <p:pic>
+        <p:nvPicPr>
+          <p:cNvPr id="4" name="Picture 3" descr="A screenshot of a computer&#10;&#10;AI-generated content may be incorrect.">
+            <a:extLst>
+              <a:ext uri="{FF2B5EF4-FFF2-40B4-BE49-F238E27FC236}">
+                <a16:creationId xmlns:a16="http://schemas.microsoft.com/office/drawing/2014/main" id="{08D5D30F-677F-8479-79E5-878CE5246001}"/>
+              </a:ext>
+            </a:extLst>
+          </p:cNvPr>
+          <p:cNvPicPr>
+            <a:picLocks noChangeAspect="1"/>
+          </p:cNvPicPr>
+          <p:nvPr/>
+        </p:nvPicPr>
+        <p:blipFill>
+          <a:blip r:embed="rId3"/>
+          <a:stretch>
+            <a:fillRect/>
+          </a:stretch>
+        </p:blipFill>
+        <p:spPr>
+          <a:xfrm>
+            <a:off x="234489" y="665117"/>
+            <a:ext cx="8675022" cy="2226942"/>
+          </a:xfrm>
+          <a:prstGeom prst="rect">
+            <a:avLst/>
+          </a:prstGeom>
+        </p:spPr>
+      </p:pic>
+    </p:spTree>
+    <p:extLst>
+      <p:ext uri="{BB962C8B-B14F-4D97-AF65-F5344CB8AC3E}">
+        <p14:creationId xmlns:p14="http://schemas.microsoft.com/office/powerpoint/2010/main" val="3177801300"/>
+      </p:ext>
+    </p:extLst>
+  </p:cSld>
+  <p:clrMapOvr>
+    <a:masterClrMapping/>
+  </p:clrMapOvr>
+</p:sld>
+</file>
+
+<file path=ppt/slides/slide34.xml><?xml version="1.0" encoding="utf-8"?>
+<p:sld xmlns:a="http://schemas.openxmlformats.org/drawingml/2006/main" xmlns:r="http://schemas.openxmlformats.org/officeDocument/2006/relationships" xmlns:p="http://schemas.openxmlformats.org/presentationml/2006/main">
+  <p:cSld>
+    <p:spTree>
+      <p:nvGrpSpPr>
+        <p:cNvPr id="1" name="Shape 187">
+          <a:extLst>
+            <a:ext uri="{FF2B5EF4-FFF2-40B4-BE49-F238E27FC236}">
               <a16:creationId xmlns:a16="http://schemas.microsoft.com/office/drawing/2014/main" id="{9809A8D0-DF4F-253B-8839-5B81753736DD}"/>
             </a:ext>
           </a:extLst>
@@ -41050,7 +42474,7 @@
             </a:pPr>
             <a:fld id="{00000000-1234-1234-1234-123412341234}" type="slidenum">
               <a:rPr lang="en-US" smtClean="0"/>
-              <a:t>32</a:t>
+              <a:t>34</a:t>
             </a:fld>
             <a:endParaRPr lang="en-US"/>
           </a:p>
@@ -41069,7 +42493,7 @@
 </p:sld>
 </file>
 
-<file path=ppt/slides/slide33.xml><?xml version="1.0" encoding="utf-8"?>
+<file path=ppt/slides/slide35.xml><?xml version="1.0" encoding="utf-8"?>
 <p:sld xmlns:a="http://schemas.openxmlformats.org/drawingml/2006/main" xmlns:r="http://schemas.openxmlformats.org/officeDocument/2006/relationships" xmlns:p="http://schemas.openxmlformats.org/presentationml/2006/main">
   <p:cSld>
     <p:spTree>
@@ -41145,7 +42569,7 @@
             </a:pPr>
             <a:fld id="{00000000-1234-1234-1234-123412341234}" type="slidenum">
               <a:rPr lang="en-US" smtClean="0"/>
-              <a:t>33</a:t>
+              <a:t>35</a:t>
             </a:fld>
             <a:endParaRPr lang="en-US"/>
           </a:p>
@@ -41159,7 +42583,7 @@
 </p:sld>
 </file>
 
-<file path=ppt/slides/slide34.xml><?xml version="1.0" encoding="utf-8"?>
+<file path=ppt/slides/slide36.xml><?xml version="1.0" encoding="utf-8"?>
 <p:sld xmlns:a="http://schemas.openxmlformats.org/drawingml/2006/main" xmlns:r="http://schemas.openxmlformats.org/officeDocument/2006/relationships" xmlns:p="http://schemas.openxmlformats.org/presentationml/2006/main">
   <p:cSld>
     <p:spTree>
@@ -41235,7 +42659,7 @@
             </a:pPr>
             <a:fld id="{00000000-1234-1234-1234-123412341234}" type="slidenum">
               <a:rPr lang="en-US" smtClean="0"/>
-              <a:t>34</a:t>
+              <a:t>36</a:t>
             </a:fld>
             <a:endParaRPr lang="en-US"/>
           </a:p>
@@ -41249,7 +42673,7 @@
 </p:sld>
 </file>
 
-<file path=ppt/slides/slide35.xml><?xml version="1.0" encoding="utf-8"?>
+<file path=ppt/slides/slide37.xml><?xml version="1.0" encoding="utf-8"?>
 <p:sld xmlns:a="http://schemas.openxmlformats.org/drawingml/2006/main" xmlns:r="http://schemas.openxmlformats.org/officeDocument/2006/relationships" xmlns:p="http://schemas.openxmlformats.org/presentationml/2006/main">
   <p:cSld>
     <p:spTree>
@@ -41369,7 +42793,7 @@
             </a:pPr>
             <a:fld id="{00000000-1234-1234-1234-123412341234}" type="slidenum">
               <a:rPr lang="en-US" smtClean="0"/>
-              <a:t>35</a:t>
+              <a:t>37</a:t>
             </a:fld>
             <a:endParaRPr lang="en-US"/>
           </a:p>
@@ -41383,7 +42807,7 @@
 </p:sld>
 </file>
 
-<file path=ppt/slides/slide36.xml><?xml version="1.0" encoding="utf-8"?>
+<file path=ppt/slides/slide38.xml><?xml version="1.0" encoding="utf-8"?>
 <p:sld xmlns:a="http://schemas.openxmlformats.org/drawingml/2006/main" xmlns:r="http://schemas.openxmlformats.org/officeDocument/2006/relationships" xmlns:p="http://schemas.openxmlformats.org/presentationml/2006/main">
   <p:cSld>
     <p:spTree>
@@ -41587,7 +43011,7 @@
             </a:pPr>
             <a:fld id="{00000000-1234-1234-1234-123412341234}" type="slidenum">
               <a:rPr lang="en-US" smtClean="0"/>
-              <a:t>36</a:t>
+              <a:t>38</a:t>
             </a:fld>
             <a:endParaRPr lang="en-US"/>
           </a:p>
@@ -41601,7 +43025,7 @@
 </p:sld>
 </file>
 
-<file path=ppt/slides/slide37.xml><?xml version="1.0" encoding="utf-8"?>
+<file path=ppt/slides/slide39.xml><?xml version="1.0" encoding="utf-8"?>
 <p:sld xmlns:a="http://schemas.openxmlformats.org/drawingml/2006/main" xmlns:r="http://schemas.openxmlformats.org/officeDocument/2006/relationships" xmlns:p="http://schemas.openxmlformats.org/presentationml/2006/main">
   <p:cSld>
     <p:spTree>
@@ -41677,7 +43101,7 @@
             </a:pPr>
             <a:fld id="{00000000-1234-1234-1234-123412341234}" type="slidenum">
               <a:rPr lang="en-US" smtClean="0"/>
-              <a:t>37</a:t>
+              <a:t>39</a:t>
             </a:fld>
             <a:endParaRPr lang="en-US"/>
           </a:p>
@@ -41691,7 +43115,414 @@
 </p:sld>
 </file>
 
-<file path=ppt/slides/slide38.xml><?xml version="1.0" encoding="utf-8"?>
+<file path=ppt/slides/slide4.xml><?xml version="1.0" encoding="utf-8"?>
+<p:sld xmlns:a="http://schemas.openxmlformats.org/drawingml/2006/main" xmlns:r="http://schemas.openxmlformats.org/officeDocument/2006/relationships" xmlns:p="http://schemas.openxmlformats.org/presentationml/2006/main">
+  <p:cSld>
+    <p:spTree>
+      <p:nvGrpSpPr>
+        <p:cNvPr id="1" name="Shape 169"/>
+        <p:cNvGrpSpPr/>
+        <p:nvPr/>
+      </p:nvGrpSpPr>
+      <p:grpSpPr>
+        <a:xfrm>
+          <a:off x="0" y="0"/>
+          <a:ext cx="0" cy="0"/>
+          <a:chOff x="0" y="0"/>
+          <a:chExt cx="0" cy="0"/>
+        </a:xfrm>
+      </p:grpSpPr>
+      <p:sp>
+        <p:nvSpPr>
+          <p:cNvPr id="170" name="Google Shape;170;p37"/>
+          <p:cNvSpPr txBox="1">
+            <a:spLocks noGrp="1"/>
+          </p:cNvSpPr>
+          <p:nvPr>
+            <p:ph type="title"/>
+          </p:nvPr>
+        </p:nvSpPr>
+        <p:spPr>
+          <a:xfrm>
+            <a:off x="202550" y="289279"/>
+            <a:ext cx="8520600" cy="572700"/>
+          </a:xfrm>
+          <a:prstGeom prst="rect">
+            <a:avLst/>
+          </a:prstGeom>
+          <a:noFill/>
+          <a:ln>
+            <a:noFill/>
+          </a:ln>
+        </p:spPr>
+        <p:txBody>
+          <a:bodyPr spcFirstLastPara="1" wrap="square" lIns="91425" tIns="91425" rIns="91425" bIns="91425" anchor="t" anchorCtr="0">
+            <a:noAutofit/>
+          </a:bodyPr>
+          <a:lstStyle/>
+          <a:p>
+            <a:pPr marL="0" lvl="0" indent="0" algn="l" rtl="0">
+              <a:lnSpc>
+                <a:spcPct val="100000"/>
+              </a:lnSpc>
+              <a:spcBef>
+                <a:spcPts val="0"/>
+              </a:spcBef>
+              <a:spcAft>
+                <a:spcPts val="0"/>
+              </a:spcAft>
+              <a:buSzPts val="2200"/>
+              <a:buNone/>
+            </a:pPr>
+            <a:r>
+              <a:rPr lang="en-US">
+                <a:solidFill>
+                  <a:schemeClr val="lt2"/>
+                </a:solidFill>
+                <a:latin typeface="Century Gothic"/>
+                <a:ea typeface="Century Gothic"/>
+                <a:cs typeface="Century Gothic"/>
+                <a:sym typeface="Century Gothic"/>
+              </a:rPr>
+              <a:t>Data Dictionary</a:t>
+            </a:r>
+            <a:endParaRPr>
+              <a:solidFill>
+                <a:schemeClr val="lt2"/>
+              </a:solidFill>
+              <a:latin typeface="Century Gothic"/>
+              <a:ea typeface="Century Gothic"/>
+              <a:cs typeface="Century Gothic"/>
+              <a:sym typeface="Century Gothic"/>
+            </a:endParaRPr>
+          </a:p>
+        </p:txBody>
+      </p:sp>
+      <p:sp>
+        <p:nvSpPr>
+          <p:cNvPr id="171" name="Google Shape;171;p37"/>
+          <p:cNvSpPr txBox="1">
+            <a:spLocks noGrp="1"/>
+          </p:cNvSpPr>
+          <p:nvPr>
+            <p:ph type="body" idx="1"/>
+          </p:nvPr>
+        </p:nvSpPr>
+        <p:spPr>
+          <a:xfrm>
+            <a:off x="311750" y="861975"/>
+            <a:ext cx="8520600" cy="3706800"/>
+          </a:xfrm>
+          <a:prstGeom prst="rect">
+            <a:avLst/>
+          </a:prstGeom>
+          <a:noFill/>
+          <a:ln>
+            <a:noFill/>
+          </a:ln>
+        </p:spPr>
+        <p:txBody>
+          <a:bodyPr spcFirstLastPara="1" wrap="square" lIns="91425" tIns="91425" rIns="91425" bIns="91425" anchor="t" anchorCtr="0">
+            <a:noAutofit/>
+          </a:bodyPr>
+          <a:lstStyle/>
+          <a:p>
+            <a:pPr marL="457200" lvl="0" indent="-228600" algn="l" rtl="0">
+              <a:lnSpc>
+                <a:spcPct val="150000"/>
+              </a:lnSpc>
+              <a:spcBef>
+                <a:spcPts val="1000"/>
+              </a:spcBef>
+              <a:spcAft>
+                <a:spcPts val="0"/>
+              </a:spcAft>
+              <a:buClr>
+                <a:schemeClr val="dk1"/>
+              </a:buClr>
+              <a:buSzPts val="1200"/>
+              <a:buFont typeface="Century Gothic"/>
+              <a:buNone/>
+            </a:pPr>
+            <a:endParaRPr sz="1200">
+              <a:solidFill>
+                <a:schemeClr val="dk1"/>
+              </a:solidFill>
+              <a:latin typeface="Century Gothic"/>
+              <a:ea typeface="Century Gothic"/>
+              <a:cs typeface="Century Gothic"/>
+              <a:sym typeface="Century Gothic"/>
+            </a:endParaRPr>
+          </a:p>
+          <a:p>
+            <a:pPr marL="457200" lvl="0" indent="-304800" algn="l" rtl="0">
+              <a:lnSpc>
+                <a:spcPct val="150000"/>
+              </a:lnSpc>
+              <a:spcBef>
+                <a:spcPts val="1000"/>
+              </a:spcBef>
+              <a:spcAft>
+                <a:spcPts val="0"/>
+              </a:spcAft>
+              <a:buClr>
+                <a:schemeClr val="dk1"/>
+              </a:buClr>
+              <a:buSzPts val="1200"/>
+              <a:buFont typeface="Century Gothic"/>
+              <a:buChar char="●"/>
+            </a:pPr>
+            <a:r>
+              <a:rPr lang="en-US" sz="1200">
+                <a:solidFill>
+                  <a:schemeClr val="dk1"/>
+                </a:solidFill>
+                <a:latin typeface="Century Gothic"/>
+                <a:ea typeface="Century Gothic"/>
+                <a:cs typeface="Century Gothic"/>
+                <a:sym typeface="Century Gothic"/>
+              </a:rPr>
+              <a:t>DEROG: Number of major derogatory reports (serious delinquency/late payments)</a:t>
+            </a:r>
+            <a:endParaRPr/>
+          </a:p>
+          <a:p>
+            <a:pPr marL="457200" lvl="0" indent="-304800" algn="l" rtl="0">
+              <a:lnSpc>
+                <a:spcPct val="150000"/>
+              </a:lnSpc>
+              <a:spcBef>
+                <a:spcPts val="1000"/>
+              </a:spcBef>
+              <a:spcAft>
+                <a:spcPts val="0"/>
+              </a:spcAft>
+              <a:buClr>
+                <a:schemeClr val="dk1"/>
+              </a:buClr>
+              <a:buSzPts val="1200"/>
+              <a:buFont typeface="Century Gothic"/>
+              <a:buChar char="●"/>
+            </a:pPr>
+            <a:r>
+              <a:rPr lang="en-US" sz="1200">
+                <a:solidFill>
+                  <a:schemeClr val="dk1"/>
+                </a:solidFill>
+                <a:latin typeface="Century Gothic"/>
+                <a:ea typeface="Century Gothic"/>
+                <a:cs typeface="Century Gothic"/>
+                <a:sym typeface="Century Gothic"/>
+              </a:rPr>
+              <a:t>DELINQ: Number of delinquent credit lines (past due payments)</a:t>
+            </a:r>
+            <a:endParaRPr/>
+          </a:p>
+          <a:p>
+            <a:pPr marL="457200" lvl="0" indent="-304800" algn="l" rtl="0">
+              <a:lnSpc>
+                <a:spcPct val="150000"/>
+              </a:lnSpc>
+              <a:spcBef>
+                <a:spcPts val="1000"/>
+              </a:spcBef>
+              <a:spcAft>
+                <a:spcPts val="0"/>
+              </a:spcAft>
+              <a:buClr>
+                <a:schemeClr val="dk1"/>
+              </a:buClr>
+              <a:buSzPts val="1200"/>
+              <a:buFont typeface="Century Gothic"/>
+              <a:buChar char="●"/>
+            </a:pPr>
+            <a:r>
+              <a:rPr lang="en-US" sz="1200">
+                <a:solidFill>
+                  <a:schemeClr val="dk1"/>
+                </a:solidFill>
+                <a:latin typeface="Century Gothic"/>
+                <a:ea typeface="Century Gothic"/>
+                <a:cs typeface="Century Gothic"/>
+                <a:sym typeface="Century Gothic"/>
+              </a:rPr>
+              <a:t>CLAGE: Age of the oldest credit line in months</a:t>
+            </a:r>
+            <a:endParaRPr/>
+          </a:p>
+          <a:p>
+            <a:pPr marL="457200" lvl="0" indent="-304800" algn="l" rtl="0">
+              <a:lnSpc>
+                <a:spcPct val="150000"/>
+              </a:lnSpc>
+              <a:spcBef>
+                <a:spcPts val="1000"/>
+              </a:spcBef>
+              <a:spcAft>
+                <a:spcPts val="0"/>
+              </a:spcAft>
+              <a:buClr>
+                <a:schemeClr val="dk1"/>
+              </a:buClr>
+              <a:buSzPts val="1200"/>
+              <a:buFont typeface="Century Gothic"/>
+              <a:buChar char="●"/>
+            </a:pPr>
+            <a:r>
+              <a:rPr lang="en-US" sz="1200">
+                <a:solidFill>
+                  <a:schemeClr val="dk1"/>
+                </a:solidFill>
+                <a:latin typeface="Century Gothic"/>
+                <a:ea typeface="Century Gothic"/>
+                <a:cs typeface="Century Gothic"/>
+                <a:sym typeface="Century Gothic"/>
+              </a:rPr>
+              <a:t>NINQ: Number of recent credit inquiries</a:t>
+            </a:r>
+            <a:endParaRPr/>
+          </a:p>
+          <a:p>
+            <a:pPr marL="457200" lvl="0" indent="-304800" algn="l" rtl="0">
+              <a:lnSpc>
+                <a:spcPct val="150000"/>
+              </a:lnSpc>
+              <a:spcBef>
+                <a:spcPts val="1000"/>
+              </a:spcBef>
+              <a:spcAft>
+                <a:spcPts val="0"/>
+              </a:spcAft>
+              <a:buClr>
+                <a:schemeClr val="dk1"/>
+              </a:buClr>
+              <a:buSzPts val="1200"/>
+              <a:buFont typeface="Century Gothic"/>
+              <a:buChar char="●"/>
+            </a:pPr>
+            <a:r>
+              <a:rPr lang="en-US" sz="1200">
+                <a:solidFill>
+                  <a:schemeClr val="dk1"/>
+                </a:solidFill>
+                <a:latin typeface="Century Gothic"/>
+                <a:ea typeface="Century Gothic"/>
+                <a:cs typeface="Century Gothic"/>
+                <a:sym typeface="Century Gothic"/>
+              </a:rPr>
+              <a:t>CLNO: Number of existing credit lines</a:t>
+            </a:r>
+            <a:endParaRPr/>
+          </a:p>
+          <a:p>
+            <a:pPr marL="457200" lvl="0" indent="-304800" algn="l" rtl="0">
+              <a:lnSpc>
+                <a:spcPct val="150000"/>
+              </a:lnSpc>
+              <a:spcBef>
+                <a:spcPts val="1000"/>
+              </a:spcBef>
+              <a:spcAft>
+                <a:spcPts val="0"/>
+              </a:spcAft>
+              <a:buClr>
+                <a:schemeClr val="dk1"/>
+              </a:buClr>
+              <a:buSzPts val="1200"/>
+              <a:buFont typeface="Century Gothic"/>
+              <a:buChar char="●"/>
+            </a:pPr>
+            <a:r>
+              <a:rPr lang="en-US" sz="1200">
+                <a:solidFill>
+                  <a:schemeClr val="dk1"/>
+                </a:solidFill>
+                <a:latin typeface="Century Gothic"/>
+                <a:ea typeface="Century Gothic"/>
+                <a:cs typeface="Century Gothic"/>
+                <a:sym typeface="Century Gothic"/>
+              </a:rPr>
+              <a:t>DEBTINC: Debt-to-income ratio (all monthly debt payments divided by gross monthly income)</a:t>
+            </a:r>
+            <a:endParaRPr/>
+          </a:p>
+          <a:p>
+            <a:pPr marL="914400" lvl="0" indent="-228600" algn="l" rtl="0">
+              <a:lnSpc>
+                <a:spcPct val="115000"/>
+              </a:lnSpc>
+              <a:spcBef>
+                <a:spcPts val="1000"/>
+              </a:spcBef>
+              <a:spcAft>
+                <a:spcPts val="0"/>
+              </a:spcAft>
+              <a:buClr>
+                <a:srgbClr val="2D3B45"/>
+              </a:buClr>
+              <a:buSzPts val="1200"/>
+              <a:buFont typeface="Century Gothic"/>
+              <a:buNone/>
+            </a:pPr>
+            <a:endParaRPr sz="1200">
+              <a:solidFill>
+                <a:schemeClr val="dk1"/>
+              </a:solidFill>
+              <a:latin typeface="Century Gothic"/>
+              <a:ea typeface="Century Gothic"/>
+              <a:cs typeface="Century Gothic"/>
+              <a:sym typeface="Century Gothic"/>
+            </a:endParaRPr>
+          </a:p>
+        </p:txBody>
+      </p:sp>
+      <p:sp>
+        <p:nvSpPr>
+          <p:cNvPr id="2" name="Slide Number Placeholder 1">
+            <a:extLst>
+              <a:ext uri="{FF2B5EF4-FFF2-40B4-BE49-F238E27FC236}">
+                <a16:creationId xmlns:a16="http://schemas.microsoft.com/office/drawing/2014/main" id="{CC5786F4-E255-FBF4-D23D-7D139A55AF1F}"/>
+              </a:ext>
+            </a:extLst>
+          </p:cNvPr>
+          <p:cNvSpPr>
+            <a:spLocks noGrp="1"/>
+          </p:cNvSpPr>
+          <p:nvPr>
+            <p:ph type="sldNum" idx="12"/>
+          </p:nvPr>
+        </p:nvSpPr>
+        <p:spPr/>
+        <p:txBody>
+          <a:bodyPr/>
+          <a:lstStyle/>
+          <a:p>
+            <a:pPr marL="0" lvl="0" indent="0" algn="ctr" rtl="0">
+              <a:spcBef>
+                <a:spcPts val="0"/>
+              </a:spcBef>
+              <a:spcAft>
+                <a:spcPts val="0"/>
+              </a:spcAft>
+              <a:buNone/>
+            </a:pPr>
+            <a:fld id="{00000000-1234-1234-1234-123412341234}" type="slidenum">
+              <a:rPr lang="en-US" smtClean="0"/>
+              <a:t>4</a:t>
+            </a:fld>
+            <a:endParaRPr lang="en-US"/>
+          </a:p>
+        </p:txBody>
+      </p:sp>
+    </p:spTree>
+  </p:cSld>
+  <p:clrMapOvr>
+    <a:masterClrMapping/>
+  </p:clrMapOvr>
+</p:sld>
+</file>
+
+<file path=ppt/slides/slide40.xml><?xml version="1.0" encoding="utf-8"?>
 <p:sld xmlns:a="http://schemas.openxmlformats.org/drawingml/2006/main" xmlns:r="http://schemas.openxmlformats.org/officeDocument/2006/relationships" xmlns:p="http://schemas.openxmlformats.org/presentationml/2006/main">
   <p:cSld>
     <p:spTree>
@@ -41811,7 +43642,7 @@
             </a:pPr>
             <a:fld id="{00000000-1234-1234-1234-123412341234}" type="slidenum">
               <a:rPr lang="en-US" smtClean="0"/>
-              <a:t>38</a:t>
+              <a:t>40</a:t>
             </a:fld>
             <a:endParaRPr lang="en-US"/>
           </a:p>
@@ -41825,7 +43656,7 @@
 </p:sld>
 </file>
 
-<file path=ppt/slides/slide39.xml><?xml version="1.0" encoding="utf-8"?>
+<file path=ppt/slides/slide41.xml><?xml version="1.0" encoding="utf-8"?>
 <p:sld xmlns:a="http://schemas.openxmlformats.org/drawingml/2006/main" xmlns:r="http://schemas.openxmlformats.org/officeDocument/2006/relationships" xmlns:p="http://schemas.openxmlformats.org/presentationml/2006/main">
   <p:cSld>
     <p:spTree>
@@ -41901,7 +43732,7 @@
             </a:pPr>
             <a:fld id="{00000000-1234-1234-1234-123412341234}" type="slidenum">
               <a:rPr lang="en-US" smtClean="0"/>
-              <a:t>39</a:t>
+              <a:t>41</a:t>
             </a:fld>
             <a:endParaRPr lang="en-US"/>
           </a:p>
@@ -41915,414 +43746,7 @@
 </p:sld>
 </file>
 
-<file path=ppt/slides/slide4.xml><?xml version="1.0" encoding="utf-8"?>
-<p:sld xmlns:a="http://schemas.openxmlformats.org/drawingml/2006/main" xmlns:r="http://schemas.openxmlformats.org/officeDocument/2006/relationships" xmlns:p="http://schemas.openxmlformats.org/presentationml/2006/main">
-  <p:cSld>
-    <p:spTree>
-      <p:nvGrpSpPr>
-        <p:cNvPr id="1" name="Shape 169"/>
-        <p:cNvGrpSpPr/>
-        <p:nvPr/>
-      </p:nvGrpSpPr>
-      <p:grpSpPr>
-        <a:xfrm>
-          <a:off x="0" y="0"/>
-          <a:ext cx="0" cy="0"/>
-          <a:chOff x="0" y="0"/>
-          <a:chExt cx="0" cy="0"/>
-        </a:xfrm>
-      </p:grpSpPr>
-      <p:sp>
-        <p:nvSpPr>
-          <p:cNvPr id="170" name="Google Shape;170;p37"/>
-          <p:cNvSpPr txBox="1">
-            <a:spLocks noGrp="1"/>
-          </p:cNvSpPr>
-          <p:nvPr>
-            <p:ph type="title"/>
-          </p:nvPr>
-        </p:nvSpPr>
-        <p:spPr>
-          <a:xfrm>
-            <a:off x="202550" y="289279"/>
-            <a:ext cx="8520600" cy="572700"/>
-          </a:xfrm>
-          <a:prstGeom prst="rect">
-            <a:avLst/>
-          </a:prstGeom>
-          <a:noFill/>
-          <a:ln>
-            <a:noFill/>
-          </a:ln>
-        </p:spPr>
-        <p:txBody>
-          <a:bodyPr spcFirstLastPara="1" wrap="square" lIns="91425" tIns="91425" rIns="91425" bIns="91425" anchor="t" anchorCtr="0">
-            <a:noAutofit/>
-          </a:bodyPr>
-          <a:lstStyle/>
-          <a:p>
-            <a:pPr marL="0" lvl="0" indent="0" algn="l" rtl="0">
-              <a:lnSpc>
-                <a:spcPct val="100000"/>
-              </a:lnSpc>
-              <a:spcBef>
-                <a:spcPts val="0"/>
-              </a:spcBef>
-              <a:spcAft>
-                <a:spcPts val="0"/>
-              </a:spcAft>
-              <a:buSzPts val="2200"/>
-              <a:buNone/>
-            </a:pPr>
-            <a:r>
-              <a:rPr lang="en-US">
-                <a:solidFill>
-                  <a:schemeClr val="lt2"/>
-                </a:solidFill>
-                <a:latin typeface="Century Gothic"/>
-                <a:ea typeface="Century Gothic"/>
-                <a:cs typeface="Century Gothic"/>
-                <a:sym typeface="Century Gothic"/>
-              </a:rPr>
-              <a:t>Data Dictionary</a:t>
-            </a:r>
-            <a:endParaRPr>
-              <a:solidFill>
-                <a:schemeClr val="lt2"/>
-              </a:solidFill>
-              <a:latin typeface="Century Gothic"/>
-              <a:ea typeface="Century Gothic"/>
-              <a:cs typeface="Century Gothic"/>
-              <a:sym typeface="Century Gothic"/>
-            </a:endParaRPr>
-          </a:p>
-        </p:txBody>
-      </p:sp>
-      <p:sp>
-        <p:nvSpPr>
-          <p:cNvPr id="171" name="Google Shape;171;p37"/>
-          <p:cNvSpPr txBox="1">
-            <a:spLocks noGrp="1"/>
-          </p:cNvSpPr>
-          <p:nvPr>
-            <p:ph type="body" idx="1"/>
-          </p:nvPr>
-        </p:nvSpPr>
-        <p:spPr>
-          <a:xfrm>
-            <a:off x="311750" y="861975"/>
-            <a:ext cx="8520600" cy="3706800"/>
-          </a:xfrm>
-          <a:prstGeom prst="rect">
-            <a:avLst/>
-          </a:prstGeom>
-          <a:noFill/>
-          <a:ln>
-            <a:noFill/>
-          </a:ln>
-        </p:spPr>
-        <p:txBody>
-          <a:bodyPr spcFirstLastPara="1" wrap="square" lIns="91425" tIns="91425" rIns="91425" bIns="91425" anchor="t" anchorCtr="0">
-            <a:noAutofit/>
-          </a:bodyPr>
-          <a:lstStyle/>
-          <a:p>
-            <a:pPr marL="457200" lvl="0" indent="-228600" algn="l" rtl="0">
-              <a:lnSpc>
-                <a:spcPct val="150000"/>
-              </a:lnSpc>
-              <a:spcBef>
-                <a:spcPts val="1000"/>
-              </a:spcBef>
-              <a:spcAft>
-                <a:spcPts val="0"/>
-              </a:spcAft>
-              <a:buClr>
-                <a:schemeClr val="dk1"/>
-              </a:buClr>
-              <a:buSzPts val="1200"/>
-              <a:buFont typeface="Century Gothic"/>
-              <a:buNone/>
-            </a:pPr>
-            <a:endParaRPr sz="1200">
-              <a:solidFill>
-                <a:schemeClr val="dk1"/>
-              </a:solidFill>
-              <a:latin typeface="Century Gothic"/>
-              <a:ea typeface="Century Gothic"/>
-              <a:cs typeface="Century Gothic"/>
-              <a:sym typeface="Century Gothic"/>
-            </a:endParaRPr>
-          </a:p>
-          <a:p>
-            <a:pPr marL="457200" lvl="0" indent="-304800" algn="l" rtl="0">
-              <a:lnSpc>
-                <a:spcPct val="150000"/>
-              </a:lnSpc>
-              <a:spcBef>
-                <a:spcPts val="1000"/>
-              </a:spcBef>
-              <a:spcAft>
-                <a:spcPts val="0"/>
-              </a:spcAft>
-              <a:buClr>
-                <a:schemeClr val="dk1"/>
-              </a:buClr>
-              <a:buSzPts val="1200"/>
-              <a:buFont typeface="Century Gothic"/>
-              <a:buChar char="●"/>
-            </a:pPr>
-            <a:r>
-              <a:rPr lang="en-US" sz="1200">
-                <a:solidFill>
-                  <a:schemeClr val="dk1"/>
-                </a:solidFill>
-                <a:latin typeface="Century Gothic"/>
-                <a:ea typeface="Century Gothic"/>
-                <a:cs typeface="Century Gothic"/>
-                <a:sym typeface="Century Gothic"/>
-              </a:rPr>
-              <a:t>DEROG: Number of major derogatory reports (serious delinquency/late payments)</a:t>
-            </a:r>
-            <a:endParaRPr/>
-          </a:p>
-          <a:p>
-            <a:pPr marL="457200" lvl="0" indent="-304800" algn="l" rtl="0">
-              <a:lnSpc>
-                <a:spcPct val="150000"/>
-              </a:lnSpc>
-              <a:spcBef>
-                <a:spcPts val="1000"/>
-              </a:spcBef>
-              <a:spcAft>
-                <a:spcPts val="0"/>
-              </a:spcAft>
-              <a:buClr>
-                <a:schemeClr val="dk1"/>
-              </a:buClr>
-              <a:buSzPts val="1200"/>
-              <a:buFont typeface="Century Gothic"/>
-              <a:buChar char="●"/>
-            </a:pPr>
-            <a:r>
-              <a:rPr lang="en-US" sz="1200">
-                <a:solidFill>
-                  <a:schemeClr val="dk1"/>
-                </a:solidFill>
-                <a:latin typeface="Century Gothic"/>
-                <a:ea typeface="Century Gothic"/>
-                <a:cs typeface="Century Gothic"/>
-                <a:sym typeface="Century Gothic"/>
-              </a:rPr>
-              <a:t>DELINQ: Number of delinquent credit lines (past due payments)</a:t>
-            </a:r>
-            <a:endParaRPr/>
-          </a:p>
-          <a:p>
-            <a:pPr marL="457200" lvl="0" indent="-304800" algn="l" rtl="0">
-              <a:lnSpc>
-                <a:spcPct val="150000"/>
-              </a:lnSpc>
-              <a:spcBef>
-                <a:spcPts val="1000"/>
-              </a:spcBef>
-              <a:spcAft>
-                <a:spcPts val="0"/>
-              </a:spcAft>
-              <a:buClr>
-                <a:schemeClr val="dk1"/>
-              </a:buClr>
-              <a:buSzPts val="1200"/>
-              <a:buFont typeface="Century Gothic"/>
-              <a:buChar char="●"/>
-            </a:pPr>
-            <a:r>
-              <a:rPr lang="en-US" sz="1200">
-                <a:solidFill>
-                  <a:schemeClr val="dk1"/>
-                </a:solidFill>
-                <a:latin typeface="Century Gothic"/>
-                <a:ea typeface="Century Gothic"/>
-                <a:cs typeface="Century Gothic"/>
-                <a:sym typeface="Century Gothic"/>
-              </a:rPr>
-              <a:t>CLAGE: Age of the oldest credit line in months</a:t>
-            </a:r>
-            <a:endParaRPr/>
-          </a:p>
-          <a:p>
-            <a:pPr marL="457200" lvl="0" indent="-304800" algn="l" rtl="0">
-              <a:lnSpc>
-                <a:spcPct val="150000"/>
-              </a:lnSpc>
-              <a:spcBef>
-                <a:spcPts val="1000"/>
-              </a:spcBef>
-              <a:spcAft>
-                <a:spcPts val="0"/>
-              </a:spcAft>
-              <a:buClr>
-                <a:schemeClr val="dk1"/>
-              </a:buClr>
-              <a:buSzPts val="1200"/>
-              <a:buFont typeface="Century Gothic"/>
-              <a:buChar char="●"/>
-            </a:pPr>
-            <a:r>
-              <a:rPr lang="en-US" sz="1200">
-                <a:solidFill>
-                  <a:schemeClr val="dk1"/>
-                </a:solidFill>
-                <a:latin typeface="Century Gothic"/>
-                <a:ea typeface="Century Gothic"/>
-                <a:cs typeface="Century Gothic"/>
-                <a:sym typeface="Century Gothic"/>
-              </a:rPr>
-              <a:t>NINQ: Number of recent credit inquiries</a:t>
-            </a:r>
-            <a:endParaRPr/>
-          </a:p>
-          <a:p>
-            <a:pPr marL="457200" lvl="0" indent="-304800" algn="l" rtl="0">
-              <a:lnSpc>
-                <a:spcPct val="150000"/>
-              </a:lnSpc>
-              <a:spcBef>
-                <a:spcPts val="1000"/>
-              </a:spcBef>
-              <a:spcAft>
-                <a:spcPts val="0"/>
-              </a:spcAft>
-              <a:buClr>
-                <a:schemeClr val="dk1"/>
-              </a:buClr>
-              <a:buSzPts val="1200"/>
-              <a:buFont typeface="Century Gothic"/>
-              <a:buChar char="●"/>
-            </a:pPr>
-            <a:r>
-              <a:rPr lang="en-US" sz="1200">
-                <a:solidFill>
-                  <a:schemeClr val="dk1"/>
-                </a:solidFill>
-                <a:latin typeface="Century Gothic"/>
-                <a:ea typeface="Century Gothic"/>
-                <a:cs typeface="Century Gothic"/>
-                <a:sym typeface="Century Gothic"/>
-              </a:rPr>
-              <a:t>CLNO: Number of existing credit lines</a:t>
-            </a:r>
-            <a:endParaRPr/>
-          </a:p>
-          <a:p>
-            <a:pPr marL="457200" lvl="0" indent="-304800" algn="l" rtl="0">
-              <a:lnSpc>
-                <a:spcPct val="150000"/>
-              </a:lnSpc>
-              <a:spcBef>
-                <a:spcPts val="1000"/>
-              </a:spcBef>
-              <a:spcAft>
-                <a:spcPts val="0"/>
-              </a:spcAft>
-              <a:buClr>
-                <a:schemeClr val="dk1"/>
-              </a:buClr>
-              <a:buSzPts val="1200"/>
-              <a:buFont typeface="Century Gothic"/>
-              <a:buChar char="●"/>
-            </a:pPr>
-            <a:r>
-              <a:rPr lang="en-US" sz="1200">
-                <a:solidFill>
-                  <a:schemeClr val="dk1"/>
-                </a:solidFill>
-                <a:latin typeface="Century Gothic"/>
-                <a:ea typeface="Century Gothic"/>
-                <a:cs typeface="Century Gothic"/>
-                <a:sym typeface="Century Gothic"/>
-              </a:rPr>
-              <a:t>DEBTINC: Debt-to-income ratio (all monthly debt payments divided by gross monthly income)</a:t>
-            </a:r>
-            <a:endParaRPr/>
-          </a:p>
-          <a:p>
-            <a:pPr marL="914400" lvl="0" indent="-228600" algn="l" rtl="0">
-              <a:lnSpc>
-                <a:spcPct val="115000"/>
-              </a:lnSpc>
-              <a:spcBef>
-                <a:spcPts val="1000"/>
-              </a:spcBef>
-              <a:spcAft>
-                <a:spcPts val="0"/>
-              </a:spcAft>
-              <a:buClr>
-                <a:srgbClr val="2D3B45"/>
-              </a:buClr>
-              <a:buSzPts val="1200"/>
-              <a:buFont typeface="Century Gothic"/>
-              <a:buNone/>
-            </a:pPr>
-            <a:endParaRPr sz="1200">
-              <a:solidFill>
-                <a:schemeClr val="dk1"/>
-              </a:solidFill>
-              <a:latin typeface="Century Gothic"/>
-              <a:ea typeface="Century Gothic"/>
-              <a:cs typeface="Century Gothic"/>
-              <a:sym typeface="Century Gothic"/>
-            </a:endParaRPr>
-          </a:p>
-        </p:txBody>
-      </p:sp>
-      <p:sp>
-        <p:nvSpPr>
-          <p:cNvPr id="2" name="Slide Number Placeholder 1">
-            <a:extLst>
-              <a:ext uri="{FF2B5EF4-FFF2-40B4-BE49-F238E27FC236}">
-                <a16:creationId xmlns:a16="http://schemas.microsoft.com/office/drawing/2014/main" id="{CC5786F4-E255-FBF4-D23D-7D139A55AF1F}"/>
-              </a:ext>
-            </a:extLst>
-          </p:cNvPr>
-          <p:cNvSpPr>
-            <a:spLocks noGrp="1"/>
-          </p:cNvSpPr>
-          <p:nvPr>
-            <p:ph type="sldNum" idx="12"/>
-          </p:nvPr>
-        </p:nvSpPr>
-        <p:spPr/>
-        <p:txBody>
-          <a:bodyPr/>
-          <a:lstStyle/>
-          <a:p>
-            <a:pPr marL="0" lvl="0" indent="0" algn="ctr" rtl="0">
-              <a:spcBef>
-                <a:spcPts val="0"/>
-              </a:spcBef>
-              <a:spcAft>
-                <a:spcPts val="0"/>
-              </a:spcAft>
-              <a:buNone/>
-            </a:pPr>
-            <a:fld id="{00000000-1234-1234-1234-123412341234}" type="slidenum">
-              <a:rPr lang="en-US" smtClean="0"/>
-              <a:t>4</a:t>
-            </a:fld>
-            <a:endParaRPr lang="en-US"/>
-          </a:p>
-        </p:txBody>
-      </p:sp>
-    </p:spTree>
-  </p:cSld>
-  <p:clrMapOvr>
-    <a:masterClrMapping/>
-  </p:clrMapOvr>
-</p:sld>
-</file>
-
-<file path=ppt/slides/slide40.xml><?xml version="1.0" encoding="utf-8"?>
+<file path=ppt/slides/slide42.xml><?xml version="1.0" encoding="utf-8"?>
 <p:sld xmlns:a="http://schemas.openxmlformats.org/drawingml/2006/main" xmlns:r="http://schemas.openxmlformats.org/officeDocument/2006/relationships" xmlns:p="http://schemas.openxmlformats.org/presentationml/2006/main">
   <p:cSld>
     <p:spTree>
@@ -43001,7 +44425,7 @@
             </a:pPr>
             <a:fld id="{00000000-1234-1234-1234-123412341234}" type="slidenum">
               <a:rPr lang="en-US" smtClean="0"/>
-              <a:t>40</a:t>
+              <a:t>42</a:t>
             </a:fld>
             <a:endParaRPr lang="en-US"/>
           </a:p>
@@ -43015,7 +44439,7 @@
 </p:sld>
 </file>
 
-<file path=ppt/slides/slide41.xml><?xml version="1.0" encoding="utf-8"?>
+<file path=ppt/slides/slide43.xml><?xml version="1.0" encoding="utf-8"?>
 <p:sld xmlns:a="http://schemas.openxmlformats.org/drawingml/2006/main" xmlns:r="http://schemas.openxmlformats.org/officeDocument/2006/relationships" xmlns:p="http://schemas.openxmlformats.org/presentationml/2006/main">
   <p:cSld>
     <p:spTree>
@@ -43694,7 +45118,7 @@
             </a:pPr>
             <a:fld id="{00000000-1234-1234-1234-123412341234}" type="slidenum">
               <a:rPr lang="en-US" smtClean="0"/>
-              <a:t>41</a:t>
+              <a:t>43</a:t>
             </a:fld>
             <a:endParaRPr lang="en-US"/>
           </a:p>
@@ -43708,7 +45132,7 @@
 </p:sld>
 </file>
 
-<file path=ppt/slides/slide42.xml><?xml version="1.0" encoding="utf-8"?>
+<file path=ppt/slides/slide44.xml><?xml version="1.0" encoding="utf-8"?>
 <p:sld xmlns:a="http://schemas.openxmlformats.org/drawingml/2006/main" xmlns:r="http://schemas.openxmlformats.org/officeDocument/2006/relationships" xmlns:p="http://schemas.openxmlformats.org/presentationml/2006/main">
   <p:cSld>
     <p:spTree>
@@ -44477,7 +45901,7 @@
             </a:pPr>
             <a:fld id="{00000000-1234-1234-1234-123412341234}" type="slidenum">
               <a:rPr lang="en-US" smtClean="0"/>
-              <a:t>42</a:t>
+              <a:t>44</a:t>
             </a:fld>
             <a:endParaRPr lang="en-US"/>
           </a:p>
@@ -44491,7 +45915,7 @@
 </p:sld>
 </file>
 
-<file path=ppt/slides/slide43.xml><?xml version="1.0" encoding="utf-8"?>
+<file path=ppt/slides/slide45.xml><?xml version="1.0" encoding="utf-8"?>
 <p:sld xmlns:a="http://schemas.openxmlformats.org/drawingml/2006/main" xmlns:r="http://schemas.openxmlformats.org/officeDocument/2006/relationships" xmlns:p="http://schemas.openxmlformats.org/presentationml/2006/main">
   <p:cSld>
     <p:spTree>
@@ -45964,7 +47388,7 @@
             </a:pPr>
             <a:fld id="{00000000-1234-1234-1234-123412341234}" type="slidenum">
               <a:rPr lang="en-US" smtClean="0"/>
-              <a:t>43</a:t>
+              <a:t>45</a:t>
             </a:fld>
             <a:endParaRPr lang="en-US"/>
           </a:p>
@@ -45978,7 +47402,7 @@
 </p:sld>
 </file>
 
-<file path=ppt/slides/slide44.xml><?xml version="1.0" encoding="utf-8"?>
+<file path=ppt/slides/slide46.xml><?xml version="1.0" encoding="utf-8"?>
 <p:sld xmlns:a="http://schemas.openxmlformats.org/drawingml/2006/main" xmlns:r="http://schemas.openxmlformats.org/officeDocument/2006/relationships" xmlns:p="http://schemas.openxmlformats.org/presentationml/2006/main">
   <p:cSld>
     <p:spTree>
@@ -46163,7 +47587,7 @@
             </a:pPr>
             <a:fld id="{00000000-1234-1234-1234-123412341234}" type="slidenum">
               <a:rPr lang="en-US" smtClean="0"/>
-              <a:t>44</a:t>
+              <a:t>46</a:t>
             </a:fld>
             <a:endParaRPr lang="en-US"/>
           </a:p>
@@ -46177,7 +47601,7 @@
 </p:sld>
 </file>
 
-<file path=ppt/slides/slide45.xml><?xml version="1.0" encoding="utf-8"?>
+<file path=ppt/slides/slide47.xml><?xml version="1.0" encoding="utf-8"?>
 <p:sld xmlns:a="http://schemas.openxmlformats.org/drawingml/2006/main" xmlns:r="http://schemas.openxmlformats.org/officeDocument/2006/relationships" xmlns:p="http://schemas.openxmlformats.org/presentationml/2006/main">
   <p:cSld>
     <p:spTree>
@@ -46270,7 +47694,7 @@
 </p:sld>
 </file>
 
-<file path=ppt/slides/slide46.xml><?xml version="1.0" encoding="utf-8"?>
+<file path=ppt/slides/slide48.xml><?xml version="1.0" encoding="utf-8"?>
 <p:sld xmlns:a="http://schemas.openxmlformats.org/drawingml/2006/main" xmlns:r="http://schemas.openxmlformats.org/officeDocument/2006/relationships" xmlns:p="http://schemas.openxmlformats.org/presentationml/2006/main">
   <p:cSld>
     <p:spTree>
@@ -46455,7 +47879,7 @@
             </a:pPr>
             <a:fld id="{00000000-1234-1234-1234-123412341234}" type="slidenum">
               <a:rPr lang="en-US" smtClean="0"/>
-              <a:t>46</a:t>
+              <a:t>48</a:t>
             </a:fld>
             <a:endParaRPr lang="en-US"/>
           </a:p>
@@ -46469,7 +47893,7 @@
 </p:sld>
 </file>
 
-<file path=ppt/slides/slide47.xml><?xml version="1.0" encoding="utf-8"?>
+<file path=ppt/slides/slide49.xml><?xml version="1.0" encoding="utf-8"?>
 <p:sld xmlns:a="http://schemas.openxmlformats.org/drawingml/2006/main" xmlns:r="http://schemas.openxmlformats.org/officeDocument/2006/relationships" xmlns:p="http://schemas.openxmlformats.org/presentationml/2006/main">
   <p:cSld>
     <p:spTree>
@@ -46576,7 +48000,7 @@
             </a:pPr>
             <a:fld id="{00000000-1234-1234-1234-123412341234}" type="slidenum">
               <a:rPr lang="en-US"/>
-              <a:t>47</a:t>
+              <a:t>49</a:t>
             </a:fld>
             <a:endParaRPr/>
           </a:p>

</xml_diff>

<commit_message>
GL NN Loan Default Prediction Presentation - Added Expected Outcomes section
</commit_message>
<xml_diff>
--- a/Neural Networks - Loan Default/Loan Default Prediction Presentation - Business Interpretation - John Buczkowski.pptx
+++ b/Neural Networks - Loan Default/Loan Default Prediction Presentation - Business Interpretation - John Buczkowski.pptx
@@ -32193,8 +32193,8 @@
         </p:nvSpPr>
         <p:spPr>
           <a:xfrm>
-            <a:off x="148364" y="1322561"/>
-            <a:ext cx="8629800" cy="1989598"/>
+            <a:off x="202964" y="482009"/>
+            <a:ext cx="8629800" cy="4401101"/>
           </a:xfrm>
         </p:spPr>
         <p:txBody>
@@ -32204,11 +32204,60 @@
             <a:pPr lvl="0"/>
             <a:r>
               <a:rPr lang="en-US" b="1" dirty="0"/>
-              <a:t>Improved revenue</a:t>
+              <a:t>Model Development</a:t>
             </a:r>
             <a:r>
               <a:rPr lang="en-US" dirty="0"/>
-              <a:t>: Better inventory management and optimized cancellation policies</a:t>
+              <a:t>: </a:t>
+            </a:r>
+          </a:p>
+          <a:p>
+            <a:pPr lvl="1">
+              <a:spcBef>
+                <a:spcPts val="400"/>
+              </a:spcBef>
+            </a:pPr>
+            <a:r>
+              <a:rPr lang="en-US" dirty="0"/>
+              <a:t>Build a highly performant classification model using ANN to predict loan </a:t>
+            </a:r>
+            <a:r>
+              <a:rPr lang="en-US" dirty="0" err="1"/>
+              <a:t>efaults</a:t>
+            </a:r>
+            <a:r>
+              <a:rPr lang="en-US" dirty="0"/>
+              <a:t>.</a:t>
+            </a:r>
+          </a:p>
+          <a:p>
+            <a:pPr lvl="1">
+              <a:spcBef>
+                <a:spcPts val="400"/>
+              </a:spcBef>
+            </a:pPr>
+            <a:r>
+              <a:rPr lang="en-US" dirty="0"/>
+              <a:t>Make the model interpretable so approvals/rejections can be easily justifiable</a:t>
+            </a:r>
+          </a:p>
+          <a:p>
+            <a:pPr lvl="1">
+              <a:spcBef>
+                <a:spcPts val="400"/>
+              </a:spcBef>
+            </a:pPr>
+            <a:r>
+              <a:rPr lang="en-US" dirty="0"/>
+              <a:t>Select optimal model parameters through hyperparameter tuning (</a:t>
+            </a:r>
+            <a:r>
+              <a:rPr lang="en-US" b="1" dirty="0" err="1"/>
+              <a:t>GridSearchCV</a:t>
+            </a:r>
+            <a:r>
+              <a:rPr lang="en-US" dirty="0"/>
+              <a:t>)</a:t>
             </a:r>
           </a:p>
           <a:p>
@@ -32221,11 +32270,33 @@
             <a:pPr lvl="0"/>
             <a:r>
               <a:rPr lang="en-US" b="1" dirty="0"/>
-              <a:t>Reduced operational costs</a:t>
+              <a:t>Risk Identification</a:t>
             </a:r>
             <a:r>
               <a:rPr lang="en-US" dirty="0"/>
-              <a:t>: More efficient resource allocation</a:t>
+              <a:t>: </a:t>
+            </a:r>
+          </a:p>
+          <a:p>
+            <a:pPr lvl="1">
+              <a:spcBef>
+                <a:spcPts val="400"/>
+              </a:spcBef>
+            </a:pPr>
+            <a:r>
+              <a:rPr lang="en-US" dirty="0"/>
+              <a:t>Identify the key features that are the strongest predictors of loan default</a:t>
+            </a:r>
+          </a:p>
+          <a:p>
+            <a:pPr lvl="1">
+              <a:spcBef>
+                <a:spcPts val="400"/>
+              </a:spcBef>
+            </a:pPr>
+            <a:r>
+              <a:rPr lang="en-US" dirty="0"/>
+              <a:t>Establish acceptable risk thresholds</a:t>
             </a:r>
           </a:p>
           <a:p>
@@ -32238,11 +32309,44 @@
             <a:pPr lvl="0"/>
             <a:r>
               <a:rPr lang="en-US" b="1" dirty="0"/>
-              <a:t>Enhanced customer experience</a:t>
+              <a:t>Process Improvement</a:t>
             </a:r>
             <a:r>
               <a:rPr lang="en-US" dirty="0"/>
-              <a:t>: Customized policies for different risk segments</a:t>
+              <a:t>: </a:t>
+            </a:r>
+          </a:p>
+          <a:p>
+            <a:pPr lvl="1">
+              <a:spcBef>
+                <a:spcPts val="400"/>
+              </a:spcBef>
+            </a:pPr>
+            <a:r>
+              <a:rPr lang="en-US" dirty="0"/>
+              <a:t>Minimize human subjectivity and bias in loan decisions</a:t>
+            </a:r>
+          </a:p>
+          <a:p>
+            <a:pPr lvl="1">
+              <a:spcBef>
+                <a:spcPts val="400"/>
+              </a:spcBef>
+            </a:pPr>
+            <a:r>
+              <a:rPr lang="en-US" dirty="0"/>
+              <a:t>Streamline decision making time by adding automation to the process</a:t>
+            </a:r>
+          </a:p>
+          <a:p>
+            <a:pPr lvl="1">
+              <a:spcBef>
+                <a:spcPts val="400"/>
+              </a:spcBef>
+            </a:pPr>
+            <a:r>
+              <a:rPr lang="en-US" dirty="0"/>
+              <a:t>Establish standardized assessments for all applicants</a:t>
             </a:r>
           </a:p>
           <a:p>
@@ -32255,11 +32359,52 @@
             <a:pPr lvl="0"/>
             <a:r>
               <a:rPr lang="en-US" b="1" dirty="0"/>
-              <a:t>Data-driven decision making</a:t>
+              <a:t>Increase Business Value</a:t>
             </a:r>
             <a:r>
               <a:rPr lang="en-US" dirty="0"/>
-              <a:t>: Actionable insights for strategic planning</a:t>
+              <a:t>: </a:t>
+            </a:r>
+          </a:p>
+          <a:p>
+            <a:pPr lvl="1">
+              <a:spcBef>
+                <a:spcPts val="400"/>
+              </a:spcBef>
+            </a:pPr>
+            <a:r>
+              <a:rPr lang="en-US" dirty="0"/>
+              <a:t>Identify high-risk applicants to minimize loan defaults</a:t>
+            </a:r>
+          </a:p>
+          <a:p>
+            <a:pPr lvl="1">
+              <a:spcBef>
+                <a:spcPts val="400"/>
+              </a:spcBef>
+            </a:pPr>
+            <a:r>
+              <a:rPr lang="en-US" dirty="0"/>
+              <a:t>Reduce </a:t>
+            </a:r>
+            <a:r>
+              <a:rPr lang="en-US" dirty="0" err="1"/>
+              <a:t>labour</a:t>
+            </a:r>
+            <a:r>
+              <a:rPr lang="en-US" dirty="0"/>
+              <a:t>/manpower required in the current approval process</a:t>
+            </a:r>
+          </a:p>
+          <a:p>
+            <a:pPr lvl="1">
+              <a:spcBef>
+                <a:spcPts val="400"/>
+              </a:spcBef>
+            </a:pPr>
+            <a:r>
+              <a:rPr lang="en-US" dirty="0"/>
+              <a:t>Increase scalability (process more loans) while keep costs low</a:t>
             </a:r>
           </a:p>
           <a:p>
@@ -32267,16 +32412,6 @@
               <a:buNone/>
             </a:pPr>
             <a:endParaRPr lang="en-US" sz="400" dirty="0"/>
-          </a:p>
-          <a:p>
-            <a:r>
-              <a:rPr lang="en-US" b="1" dirty="0"/>
-              <a:t>Additional revenue streams: </a:t>
-            </a:r>
-            <a:r>
-              <a:rPr lang="en-US" dirty="0"/>
-              <a:t>Suggest new programs and strategies to capture untapped revenue streams</a:t>
-            </a:r>
           </a:p>
         </p:txBody>
       </p:sp>
@@ -35590,7 +35725,7 @@
               <a:buChar char="●"/>
             </a:pPr>
             <a:r>
-              <a:rPr lang="en-US" sz="1400">
+              <a:rPr lang="en-US" sz="1400" dirty="0">
                 <a:solidFill>
                   <a:schemeClr val="dk1"/>
                 </a:solidFill>
@@ -35601,7 +35736,7 @@
               </a:rPr>
               <a:t>Business Problem Overview &amp; Solution Approach</a:t>
             </a:r>
-            <a:endParaRPr/>
+            <a:endParaRPr dirty="0"/>
           </a:p>
           <a:p>
             <a:pPr marL="457200" lvl="0" indent="-317500" algn="l" rtl="0">
@@ -35622,7 +35757,7 @@
               <a:buChar char="●"/>
             </a:pPr>
             <a:r>
-              <a:rPr lang="en-US" sz="1400">
+              <a:rPr lang="en-US" sz="1400" dirty="0">
                 <a:solidFill>
                   <a:schemeClr val="dk1"/>
                 </a:solidFill>
@@ -35633,7 +35768,7 @@
               </a:rPr>
               <a:t>Data Dictionary</a:t>
             </a:r>
-            <a:endParaRPr/>
+            <a:endParaRPr dirty="0"/>
           </a:p>
           <a:p>
             <a:pPr marL="457200" lvl="0" indent="-317500" algn="l" rtl="0">
@@ -35654,7 +35789,7 @@
               <a:buChar char="●"/>
             </a:pPr>
             <a:r>
-              <a:rPr lang="en-US" sz="1400">
+              <a:rPr lang="en-US" sz="1400" dirty="0">
                 <a:solidFill>
                   <a:schemeClr val="dk1"/>
                 </a:solidFill>
@@ -35665,7 +35800,7 @@
               </a:rPr>
               <a:t>Exploratory Data Analysis (EDA) Results</a:t>
             </a:r>
-            <a:endParaRPr/>
+            <a:endParaRPr dirty="0"/>
           </a:p>
           <a:p>
             <a:pPr marL="457200" lvl="0" indent="-317500" algn="l" rtl="0">
@@ -35686,7 +35821,7 @@
               <a:buChar char="●"/>
             </a:pPr>
             <a:r>
-              <a:rPr lang="en-US" sz="1400">
+              <a:rPr lang="en-US" sz="1400" dirty="0">
                 <a:solidFill>
                   <a:schemeClr val="dk1"/>
                 </a:solidFill>
@@ -35697,7 +35832,7 @@
               </a:rPr>
               <a:t>Data Preprocessing</a:t>
             </a:r>
-            <a:endParaRPr/>
+            <a:endParaRPr dirty="0"/>
           </a:p>
           <a:p>
             <a:pPr marL="457200" lvl="0" indent="-317500" algn="l" rtl="0">
@@ -35718,7 +35853,7 @@
               <a:buChar char="●"/>
             </a:pPr>
             <a:r>
-              <a:rPr lang="en-US" sz="1400">
+              <a:rPr lang="en-US" sz="1400" dirty="0">
                 <a:solidFill>
                   <a:schemeClr val="dk1"/>
                 </a:solidFill>
@@ -35729,7 +35864,7 @@
               </a:rPr>
               <a:t>Model Performance Summary</a:t>
             </a:r>
-            <a:endParaRPr/>
+            <a:endParaRPr dirty="0"/>
           </a:p>
           <a:p>
             <a:pPr marL="457200" lvl="0" indent="-317500" algn="l" rtl="0">
@@ -35750,7 +35885,7 @@
               <a:buChar char="●"/>
             </a:pPr>
             <a:r>
-              <a:rPr lang="en-US" sz="1400">
+              <a:rPr lang="en-US" sz="1400" dirty="0">
                 <a:solidFill>
                   <a:schemeClr val="dk1"/>
                 </a:solidFill>
@@ -35761,7 +35896,7 @@
               </a:rPr>
               <a:t>Best Model Selection</a:t>
             </a:r>
-            <a:endParaRPr/>
+            <a:endParaRPr dirty="0"/>
           </a:p>
           <a:p>
             <a:pPr marL="457200" lvl="0" indent="-317500" algn="l" rtl="0">
@@ -35782,7 +35917,7 @@
               <a:buChar char="●"/>
             </a:pPr>
             <a:r>
-              <a:rPr lang="en-US" sz="1400">
+              <a:rPr lang="en-US" sz="1400" dirty="0">
                 <a:solidFill>
                   <a:schemeClr val="dk1"/>
                 </a:solidFill>
@@ -35793,7 +35928,7 @@
               </a:rPr>
               <a:t>Conclusions &amp; Recommendations</a:t>
             </a:r>
-            <a:endParaRPr/>
+            <a:endParaRPr dirty="0"/>
           </a:p>
           <a:p>
             <a:pPr marL="457200" lvl="0" indent="-317500" algn="l" rtl="0">
@@ -35814,7 +35949,7 @@
               <a:buChar char="●"/>
             </a:pPr>
             <a:r>
-              <a:rPr lang="en-US" sz="1400">
+              <a:rPr lang="en-US" sz="1400" dirty="0">
                 <a:solidFill>
                   <a:schemeClr val="dk1"/>
                 </a:solidFill>
@@ -35825,7 +35960,7 @@
               </a:rPr>
               <a:t>Appendix / Screenshots</a:t>
             </a:r>
-            <a:endParaRPr/>
+            <a:endParaRPr dirty="0"/>
           </a:p>
         </p:txBody>
       </p:sp>
@@ -42040,29 +42175,8 @@
                 <a:cs typeface="Century Gothic"/>
                 <a:sym typeface="Century Gothic"/>
               </a:rPr>
-              <a:t> – Better. Reduced skew</a:t>
+              <a:t> – Better. Reduced skew/kurtosis.</a:t>
             </a:r>
-            <a:r>
-              <a:rPr lang="en-US" sz="1200">
-                <a:solidFill>
-                  <a:schemeClr val="dk1"/>
-                </a:solidFill>
-                <a:latin typeface="Nunito" pitchFamily="2" charset="0"/>
-                <a:ea typeface="Century Gothic"/>
-                <a:cs typeface="Century Gothic"/>
-                <a:sym typeface="Century Gothic"/>
-              </a:rPr>
-              <a:t>/kurtosis.</a:t>
-            </a:r>
-            <a:endParaRPr lang="en-US" sz="1200" dirty="0">
-              <a:solidFill>
-                <a:schemeClr val="dk1"/>
-              </a:solidFill>
-              <a:latin typeface="Nunito" pitchFamily="2" charset="0"/>
-              <a:ea typeface="Century Gothic"/>
-              <a:cs typeface="Century Gothic"/>
-              <a:sym typeface="Century Gothic"/>
-            </a:endParaRPr>
           </a:p>
           <a:p>
             <a:pPr marL="171450" indent="-171450" algn="just">
@@ -48846,13 +48960,8 @@
             <a:pPr marL="1828800"/>
             <a:r>
               <a:rPr lang="en-US" dirty="0"/>
-              <a:t>Bottlenecks, long turn around times – reduces potential for </a:t>
+              <a:t>Bottlenecks, long turn around times – reduces potential for scalability</a:t>
             </a:r>
-            <a:r>
-              <a:rPr lang="en-US" dirty="0" err="1"/>
-              <a:t>scalibility</a:t>
-            </a:r>
-            <a:endParaRPr lang="en-US" dirty="0"/>
           </a:p>
         </p:txBody>
       </p:sp>
@@ -49124,15 +49233,7 @@
             </a:pPr>
             <a:r>
               <a:rPr lang="en-US" dirty="0"/>
-              <a:t>Build a classification model using an Artificial Neural Network (ANN) to predict clients who are likely to default on  loans. The </a:t>
-            </a:r>
-            <a:r>
-              <a:rPr lang="en-US"/>
-              <a:t>model should provide </a:t>
-            </a:r>
-            <a:r>
-              <a:rPr lang="en-US" dirty="0"/>
-              <a:t>recommendations on the key features to consider during loan approval.</a:t>
+              <a:t>Build a classification model using an Artificial Neural Network (ANN) to predict clients who are likely to default on  loans. The model should provide recommendations on the key features to consider during loan approval.</a:t>
             </a:r>
           </a:p>
         </p:txBody>

</xml_diff>